<commit_message>
Updating with glassnode information
</commit_message>
<xml_diff>
--- a/Bitcoin_presentation.pptx
+++ b/Bitcoin_presentation.pptx
@@ -12,6 +12,15 @@
     <p:sldId id="264" r:id="rId6"/>
     <p:sldId id="261" r:id="rId7"/>
     <p:sldId id="262" r:id="rId8"/>
+    <p:sldId id="266" r:id="rId9"/>
+    <p:sldId id="267" r:id="rId10"/>
+    <p:sldId id="268" r:id="rId11"/>
+    <p:sldId id="269" r:id="rId12"/>
+    <p:sldId id="270" r:id="rId13"/>
+    <p:sldId id="271" r:id="rId14"/>
+    <p:sldId id="272" r:id="rId15"/>
+    <p:sldId id="273" r:id="rId16"/>
+    <p:sldId id="274" r:id="rId17"/>
   </p:sldIdLst>
   <p:sldSz cx="12192000" cy="6858000"/>
   <p:notesSz cx="6858000" cy="9144000"/>
@@ -110,7 +119,366 @@
       </a:defRPr>
     </a:lvl9pPr>
   </p:defaultTextStyle>
+  <p:extLst>
+    <p:ext uri="{EFAFB233-063F-42B5-8137-9DF3F51BA10A}">
+      <p15:sldGuideLst xmlns:p15="http://schemas.microsoft.com/office/powerpoint/2012/main"/>
+    </p:ext>
+  </p:extLst>
 </p:presentation>
+</file>
+
+<file path=ppt/changesInfos/changesInfo1.xml><?xml version="1.0" encoding="utf-8"?>
+<pc:chgInfo xmlns:a="http://schemas.openxmlformats.org/drawingml/2006/main" xmlns:r="http://schemas.openxmlformats.org/officeDocument/2006/relationships" xmlns:ac="http://schemas.microsoft.com/office/drawing/2013/main/command" xmlns:pc="http://schemas.microsoft.com/office/powerpoint/2013/main/command">
+  <pc:docChgLst>
+    <pc:chgData name="Manpreet Padam" userId="c774c9fa3d9a7448" providerId="LiveId" clId="{797BF2CA-42B3-4463-95F1-EF67FBB049FC}"/>
+    <pc:docChg chg="undo custSel addSld delSld modSld">
+      <pc:chgData name="Manpreet Padam" userId="c774c9fa3d9a7448" providerId="LiveId" clId="{797BF2CA-42B3-4463-95F1-EF67FBB049FC}" dt="2019-10-22T20:03:46.956" v="418" actId="20577"/>
+      <pc:docMkLst>
+        <pc:docMk/>
+      </pc:docMkLst>
+      <pc:sldChg chg="addSp delSp modSp">
+        <pc:chgData name="Manpreet Padam" userId="c774c9fa3d9a7448" providerId="LiveId" clId="{797BF2CA-42B3-4463-95F1-EF67FBB049FC}" dt="2019-10-22T19:20:59.361" v="90" actId="14100"/>
+        <pc:sldMkLst>
+          <pc:docMk/>
+          <pc:sldMk cId="1929715282" sldId="262"/>
+        </pc:sldMkLst>
+        <pc:spChg chg="del mod">
+          <ac:chgData name="Manpreet Padam" userId="c774c9fa3d9a7448" providerId="LiveId" clId="{797BF2CA-42B3-4463-95F1-EF67FBB049FC}" dt="2019-10-22T18:31:48.816" v="17" actId="931"/>
+          <ac:spMkLst>
+            <pc:docMk/>
+            <pc:sldMk cId="1929715282" sldId="262"/>
+            <ac:spMk id="2" creationId="{5B113F64-7157-44D2-9504-8DF48EFA8289}"/>
+          </ac:spMkLst>
+        </pc:spChg>
+        <pc:spChg chg="add del mod">
+          <ac:chgData name="Manpreet Padam" userId="c774c9fa3d9a7448" providerId="LiveId" clId="{797BF2CA-42B3-4463-95F1-EF67FBB049FC}" dt="2019-10-22T18:35:44.205" v="23" actId="478"/>
+          <ac:spMkLst>
+            <pc:docMk/>
+            <pc:sldMk cId="1929715282" sldId="262"/>
+            <ac:spMk id="6" creationId="{A7B556AC-3ED0-4FF8-B12E-CB186A67EB3B}"/>
+          </ac:spMkLst>
+        </pc:spChg>
+        <pc:spChg chg="add mod">
+          <ac:chgData name="Manpreet Padam" userId="c774c9fa3d9a7448" providerId="LiveId" clId="{797BF2CA-42B3-4463-95F1-EF67FBB049FC}" dt="2019-10-22T19:20:59.361" v="90" actId="14100"/>
+          <ac:spMkLst>
+            <pc:docMk/>
+            <pc:sldMk cId="1929715282" sldId="262"/>
+            <ac:spMk id="10" creationId="{FA6A3351-1DB3-4235-B2A2-5EC3CC29A089}"/>
+          </ac:spMkLst>
+        </pc:spChg>
+        <pc:picChg chg="add mod">
+          <ac:chgData name="Manpreet Padam" userId="c774c9fa3d9a7448" providerId="LiveId" clId="{797BF2CA-42B3-4463-95F1-EF67FBB049FC}" dt="2019-10-22T18:39:08.577" v="60" actId="14100"/>
+          <ac:picMkLst>
+            <pc:docMk/>
+            <pc:sldMk cId="1929715282" sldId="262"/>
+            <ac:picMk id="5" creationId="{AA4C2BB5-B819-401E-A295-6E29F188A508}"/>
+          </ac:picMkLst>
+        </pc:picChg>
+      </pc:sldChg>
+      <pc:sldChg chg="addSp delSp modSp add">
+        <pc:chgData name="Manpreet Padam" userId="c774c9fa3d9a7448" providerId="LiveId" clId="{797BF2CA-42B3-4463-95F1-EF67FBB049FC}" dt="2019-10-22T19:12:54.660" v="72" actId="1076"/>
+        <pc:sldMkLst>
+          <pc:docMk/>
+          <pc:sldMk cId="1489829755" sldId="266"/>
+        </pc:sldMkLst>
+        <pc:spChg chg="add del mod">
+          <ac:chgData name="Manpreet Padam" userId="c774c9fa3d9a7448" providerId="LiveId" clId="{797BF2CA-42B3-4463-95F1-EF67FBB049FC}" dt="2019-10-22T19:12:49.417" v="71" actId="931"/>
+          <ac:spMkLst>
+            <pc:docMk/>
+            <pc:sldMk cId="1489829755" sldId="266"/>
+            <ac:spMk id="4" creationId="{B05781C4-BF0B-4A25-A0ED-8179095645D6}"/>
+          </ac:spMkLst>
+        </pc:spChg>
+        <pc:spChg chg="del mod">
+          <ac:chgData name="Manpreet Padam" userId="c774c9fa3d9a7448" providerId="LiveId" clId="{797BF2CA-42B3-4463-95F1-EF67FBB049FC}" dt="2019-10-22T19:01:29.019" v="70" actId="478"/>
+          <ac:spMkLst>
+            <pc:docMk/>
+            <pc:sldMk cId="1489829755" sldId="266"/>
+            <ac:spMk id="10" creationId="{FA6A3351-1DB3-4235-B2A2-5EC3CC29A089}"/>
+          </ac:spMkLst>
+        </pc:spChg>
+        <pc:picChg chg="del">
+          <ac:chgData name="Manpreet Padam" userId="c774c9fa3d9a7448" providerId="LiveId" clId="{797BF2CA-42B3-4463-95F1-EF67FBB049FC}" dt="2019-10-22T19:01:14.169" v="67" actId="478"/>
+          <ac:picMkLst>
+            <pc:docMk/>
+            <pc:sldMk cId="1489829755" sldId="266"/>
+            <ac:picMk id="5" creationId="{AA4C2BB5-B819-401E-A295-6E29F188A508}"/>
+          </ac:picMkLst>
+        </pc:picChg>
+        <pc:picChg chg="add mod">
+          <ac:chgData name="Manpreet Padam" userId="c774c9fa3d9a7448" providerId="LiveId" clId="{797BF2CA-42B3-4463-95F1-EF67FBB049FC}" dt="2019-10-22T19:12:54.660" v="72" actId="1076"/>
+          <ac:picMkLst>
+            <pc:docMk/>
+            <pc:sldMk cId="1489829755" sldId="266"/>
+            <ac:picMk id="7" creationId="{A49F0101-3429-45EE-8428-673D8B7E1F65}"/>
+          </ac:picMkLst>
+        </pc:picChg>
+      </pc:sldChg>
+      <pc:sldChg chg="add del">
+        <pc:chgData name="Manpreet Padam" userId="c774c9fa3d9a7448" providerId="LiveId" clId="{797BF2CA-42B3-4463-95F1-EF67FBB049FC}" dt="2019-10-22T19:01:03.948" v="65" actId="2696"/>
+        <pc:sldMkLst>
+          <pc:docMk/>
+          <pc:sldMk cId="2833458960" sldId="266"/>
+        </pc:sldMkLst>
+      </pc:sldChg>
+      <pc:sldChg chg="add del">
+        <pc:chgData name="Manpreet Padam" userId="c774c9fa3d9a7448" providerId="LiveId" clId="{797BF2CA-42B3-4463-95F1-EF67FBB049FC}" dt="2019-10-22T18:39:39.275" v="63" actId="2696"/>
+        <pc:sldMkLst>
+          <pc:docMk/>
+          <pc:sldMk cId="3031782037" sldId="266"/>
+        </pc:sldMkLst>
+      </pc:sldChg>
+      <pc:sldChg chg="addSp modSp add">
+        <pc:chgData name="Manpreet Padam" userId="c774c9fa3d9a7448" providerId="LiveId" clId="{797BF2CA-42B3-4463-95F1-EF67FBB049FC}" dt="2019-10-22T19:21:41.499" v="95" actId="20577"/>
+        <pc:sldMkLst>
+          <pc:docMk/>
+          <pc:sldMk cId="234122587" sldId="267"/>
+        </pc:sldMkLst>
+        <pc:spChg chg="add mod">
+          <ac:chgData name="Manpreet Padam" userId="c774c9fa3d9a7448" providerId="LiveId" clId="{797BF2CA-42B3-4463-95F1-EF67FBB049FC}" dt="2019-10-22T19:21:41.499" v="95" actId="20577"/>
+          <ac:spMkLst>
+            <pc:docMk/>
+            <pc:sldMk cId="234122587" sldId="267"/>
+            <ac:spMk id="8" creationId="{BD4CDDDF-384A-474B-8D04-E395134AEE1C}"/>
+          </ac:spMkLst>
+        </pc:spChg>
+        <pc:picChg chg="mod">
+          <ac:chgData name="Manpreet Padam" userId="c774c9fa3d9a7448" providerId="LiveId" clId="{797BF2CA-42B3-4463-95F1-EF67FBB049FC}" dt="2019-10-22T19:19:42.725" v="79" actId="14100"/>
+          <ac:picMkLst>
+            <pc:docMk/>
+            <pc:sldMk cId="234122587" sldId="267"/>
+            <ac:picMk id="7" creationId="{A49F0101-3429-45EE-8428-673D8B7E1F65}"/>
+          </ac:picMkLst>
+        </pc:picChg>
+      </pc:sldChg>
+      <pc:sldChg chg="addSp modSp add">
+        <pc:chgData name="Manpreet Padam" userId="c774c9fa3d9a7448" providerId="LiveId" clId="{797BF2CA-42B3-4463-95F1-EF67FBB049FC}" dt="2019-10-22T19:23:37.378" v="142" actId="20577"/>
+        <pc:sldMkLst>
+          <pc:docMk/>
+          <pc:sldMk cId="2912251798" sldId="268"/>
+        </pc:sldMkLst>
+        <pc:spChg chg="add mod">
+          <ac:chgData name="Manpreet Padam" userId="c774c9fa3d9a7448" providerId="LiveId" clId="{797BF2CA-42B3-4463-95F1-EF67FBB049FC}" dt="2019-10-22T19:23:37.378" v="142" actId="20577"/>
+          <ac:spMkLst>
+            <pc:docMk/>
+            <pc:sldMk cId="2912251798" sldId="268"/>
+            <ac:spMk id="8" creationId="{B11BA722-066A-473D-999F-A5F801118C94}"/>
+          </ac:spMkLst>
+        </pc:spChg>
+        <pc:picChg chg="mod">
+          <ac:chgData name="Manpreet Padam" userId="c774c9fa3d9a7448" providerId="LiveId" clId="{797BF2CA-42B3-4463-95F1-EF67FBB049FC}" dt="2019-10-22T19:17:42.989" v="77" actId="14826"/>
+          <ac:picMkLst>
+            <pc:docMk/>
+            <pc:sldMk cId="2912251798" sldId="268"/>
+            <ac:picMk id="7" creationId="{A49F0101-3429-45EE-8428-673D8B7E1F65}"/>
+          </ac:picMkLst>
+        </pc:picChg>
+      </pc:sldChg>
+      <pc:sldChg chg="addSp modSp add">
+        <pc:chgData name="Manpreet Padam" userId="c774c9fa3d9a7448" providerId="LiveId" clId="{797BF2CA-42B3-4463-95F1-EF67FBB049FC}" dt="2019-10-22T19:24:02.472" v="143"/>
+        <pc:sldMkLst>
+          <pc:docMk/>
+          <pc:sldMk cId="694198128" sldId="269"/>
+        </pc:sldMkLst>
+        <pc:spChg chg="add mod">
+          <ac:chgData name="Manpreet Padam" userId="c774c9fa3d9a7448" providerId="LiveId" clId="{797BF2CA-42B3-4463-95F1-EF67FBB049FC}" dt="2019-10-22T19:24:02.472" v="143"/>
+          <ac:spMkLst>
+            <pc:docMk/>
+            <pc:sldMk cId="694198128" sldId="269"/>
+            <ac:spMk id="8" creationId="{8D12C32D-A090-45AD-A73D-B2E8879B8BB3}"/>
+          </ac:spMkLst>
+        </pc:spChg>
+        <pc:picChg chg="mod">
+          <ac:chgData name="Manpreet Padam" userId="c774c9fa3d9a7448" providerId="LiveId" clId="{797BF2CA-42B3-4463-95F1-EF67FBB049FC}" dt="2019-10-22T19:18:06.494" v="78" actId="14826"/>
+          <ac:picMkLst>
+            <pc:docMk/>
+            <pc:sldMk cId="694198128" sldId="269"/>
+            <ac:picMk id="7" creationId="{A49F0101-3429-45EE-8428-673D8B7E1F65}"/>
+          </ac:picMkLst>
+        </pc:picChg>
+      </pc:sldChg>
+      <pc:sldChg chg="addSp delSp modSp add">
+        <pc:chgData name="Manpreet Padam" userId="c774c9fa3d9a7448" providerId="LiveId" clId="{797BF2CA-42B3-4463-95F1-EF67FBB049FC}" dt="2019-10-22T19:32:49.112" v="291" actId="6549"/>
+        <pc:sldMkLst>
+          <pc:docMk/>
+          <pc:sldMk cId="4182626820" sldId="270"/>
+        </pc:sldMkLst>
+        <pc:spChg chg="add del mod">
+          <ac:chgData name="Manpreet Padam" userId="c774c9fa3d9a7448" providerId="LiveId" clId="{797BF2CA-42B3-4463-95F1-EF67FBB049FC}" dt="2019-10-22T19:32:49.112" v="291" actId="6549"/>
+          <ac:spMkLst>
+            <pc:docMk/>
+            <pc:sldMk cId="4182626820" sldId="270"/>
+            <ac:spMk id="8" creationId="{8D12C32D-A090-45AD-A73D-B2E8879B8BB3}"/>
+          </ac:spMkLst>
+        </pc:spChg>
+        <pc:picChg chg="mod">
+          <ac:chgData name="Manpreet Padam" userId="c774c9fa3d9a7448" providerId="LiveId" clId="{797BF2CA-42B3-4463-95F1-EF67FBB049FC}" dt="2019-10-22T19:28:33.067" v="161" actId="1076"/>
+          <ac:picMkLst>
+            <pc:docMk/>
+            <pc:sldMk cId="4182626820" sldId="270"/>
+            <ac:picMk id="7" creationId="{A49F0101-3429-45EE-8428-673D8B7E1F65}"/>
+          </ac:picMkLst>
+        </pc:picChg>
+      </pc:sldChg>
+      <pc:sldChg chg="modSp add">
+        <pc:chgData name="Manpreet Padam" userId="c774c9fa3d9a7448" providerId="LiveId" clId="{797BF2CA-42B3-4463-95F1-EF67FBB049FC}" dt="2019-10-22T19:35:40.720" v="311" actId="20577"/>
+        <pc:sldMkLst>
+          <pc:docMk/>
+          <pc:sldMk cId="3999710041" sldId="271"/>
+        </pc:sldMkLst>
+        <pc:spChg chg="mod">
+          <ac:chgData name="Manpreet Padam" userId="c774c9fa3d9a7448" providerId="LiveId" clId="{797BF2CA-42B3-4463-95F1-EF67FBB049FC}" dt="2019-10-22T19:35:40.720" v="311" actId="20577"/>
+          <ac:spMkLst>
+            <pc:docMk/>
+            <pc:sldMk cId="3999710041" sldId="271"/>
+            <ac:spMk id="8" creationId="{8D12C32D-A090-45AD-A73D-B2E8879B8BB3}"/>
+          </ac:spMkLst>
+        </pc:spChg>
+        <pc:picChg chg="mod">
+          <ac:chgData name="Manpreet Padam" userId="c774c9fa3d9a7448" providerId="LiveId" clId="{797BF2CA-42B3-4463-95F1-EF67FBB049FC}" dt="2019-10-22T19:33:12.804" v="293" actId="14826"/>
+          <ac:picMkLst>
+            <pc:docMk/>
+            <pc:sldMk cId="3999710041" sldId="271"/>
+            <ac:picMk id="7" creationId="{A49F0101-3429-45EE-8428-673D8B7E1F65}"/>
+          </ac:picMkLst>
+        </pc:picChg>
+      </pc:sldChg>
+      <pc:sldChg chg="modSp add">
+        <pc:chgData name="Manpreet Padam" userId="c774c9fa3d9a7448" providerId="LiveId" clId="{797BF2CA-42B3-4463-95F1-EF67FBB049FC}" dt="2019-10-22T19:58:41.016" v="390" actId="20577"/>
+        <pc:sldMkLst>
+          <pc:docMk/>
+          <pc:sldMk cId="3762308055" sldId="272"/>
+        </pc:sldMkLst>
+        <pc:spChg chg="mod">
+          <ac:chgData name="Manpreet Padam" userId="c774c9fa3d9a7448" providerId="LiveId" clId="{797BF2CA-42B3-4463-95F1-EF67FBB049FC}" dt="2019-10-22T19:58:41.016" v="390" actId="20577"/>
+          <ac:spMkLst>
+            <pc:docMk/>
+            <pc:sldMk cId="3762308055" sldId="272"/>
+            <ac:spMk id="8" creationId="{8D12C32D-A090-45AD-A73D-B2E8879B8BB3}"/>
+          </ac:spMkLst>
+        </pc:spChg>
+        <pc:picChg chg="mod">
+          <ac:chgData name="Manpreet Padam" userId="c774c9fa3d9a7448" providerId="LiveId" clId="{797BF2CA-42B3-4463-95F1-EF67FBB049FC}" dt="2019-10-22T19:56:54.544" v="314" actId="14100"/>
+          <ac:picMkLst>
+            <pc:docMk/>
+            <pc:sldMk cId="3762308055" sldId="272"/>
+            <ac:picMk id="7" creationId="{A49F0101-3429-45EE-8428-673D8B7E1F65}"/>
+          </ac:picMkLst>
+        </pc:picChg>
+      </pc:sldChg>
+      <pc:sldChg chg="modSp add">
+        <pc:chgData name="Manpreet Padam" userId="c774c9fa3d9a7448" providerId="LiveId" clId="{797BF2CA-42B3-4463-95F1-EF67FBB049FC}" dt="2019-10-22T20:00:14.756" v="404" actId="20577"/>
+        <pc:sldMkLst>
+          <pc:docMk/>
+          <pc:sldMk cId="2033565333" sldId="273"/>
+        </pc:sldMkLst>
+        <pc:spChg chg="mod">
+          <ac:chgData name="Manpreet Padam" userId="c774c9fa3d9a7448" providerId="LiveId" clId="{797BF2CA-42B3-4463-95F1-EF67FBB049FC}" dt="2019-10-22T20:00:14.756" v="404" actId="20577"/>
+          <ac:spMkLst>
+            <pc:docMk/>
+            <pc:sldMk cId="2033565333" sldId="273"/>
+            <ac:spMk id="8" creationId="{8D12C32D-A090-45AD-A73D-B2E8879B8BB3}"/>
+          </ac:spMkLst>
+        </pc:spChg>
+        <pc:picChg chg="mod">
+          <ac:chgData name="Manpreet Padam" userId="c774c9fa3d9a7448" providerId="LiveId" clId="{797BF2CA-42B3-4463-95F1-EF67FBB049FC}" dt="2019-10-22T19:59:19.294" v="392" actId="14826"/>
+          <ac:picMkLst>
+            <pc:docMk/>
+            <pc:sldMk cId="2033565333" sldId="273"/>
+            <ac:picMk id="7" creationId="{A49F0101-3429-45EE-8428-673D8B7E1F65}"/>
+          </ac:picMkLst>
+        </pc:picChg>
+      </pc:sldChg>
+      <pc:sldChg chg="addSp delSp modSp add">
+        <pc:chgData name="Manpreet Padam" userId="c774c9fa3d9a7448" providerId="LiveId" clId="{797BF2CA-42B3-4463-95F1-EF67FBB049FC}" dt="2019-10-22T20:03:46.956" v="418" actId="20577"/>
+        <pc:sldMkLst>
+          <pc:docMk/>
+          <pc:sldMk cId="3736427872" sldId="274"/>
+        </pc:sldMkLst>
+        <pc:spChg chg="add del">
+          <ac:chgData name="Manpreet Padam" userId="c774c9fa3d9a7448" providerId="LiveId" clId="{797BF2CA-42B3-4463-95F1-EF67FBB049FC}" dt="2019-10-22T20:03:23.229" v="416"/>
+          <ac:spMkLst>
+            <pc:docMk/>
+            <pc:sldMk cId="3736427872" sldId="274"/>
+            <ac:spMk id="2" creationId="{42F51A40-9632-4272-8810-E8C8C307022E}"/>
+          </ac:spMkLst>
+        </pc:spChg>
+        <pc:spChg chg="add del">
+          <ac:chgData name="Manpreet Padam" userId="c774c9fa3d9a7448" providerId="LiveId" clId="{797BF2CA-42B3-4463-95F1-EF67FBB049FC}" dt="2019-10-22T20:03:23.229" v="416"/>
+          <ac:spMkLst>
+            <pc:docMk/>
+            <pc:sldMk cId="3736427872" sldId="274"/>
+            <ac:spMk id="4" creationId="{2C7ADF14-B81D-46D0-8EF8-3B00B9B7860B}"/>
+          </ac:spMkLst>
+        </pc:spChg>
+        <pc:spChg chg="add del">
+          <ac:chgData name="Manpreet Padam" userId="c774c9fa3d9a7448" providerId="LiveId" clId="{797BF2CA-42B3-4463-95F1-EF67FBB049FC}" dt="2019-10-22T20:03:22.817" v="415"/>
+          <ac:spMkLst>
+            <pc:docMk/>
+            <pc:sldMk cId="3736427872" sldId="274"/>
+            <ac:spMk id="5" creationId="{E7697CAA-9BF3-4461-B5B2-7DC6A3D842DA}"/>
+          </ac:spMkLst>
+        </pc:spChg>
+        <pc:spChg chg="add del">
+          <ac:chgData name="Manpreet Padam" userId="c774c9fa3d9a7448" providerId="LiveId" clId="{797BF2CA-42B3-4463-95F1-EF67FBB049FC}" dt="2019-10-22T20:03:22.817" v="415"/>
+          <ac:spMkLst>
+            <pc:docMk/>
+            <pc:sldMk cId="3736427872" sldId="274"/>
+            <ac:spMk id="6" creationId="{1D5B0FB0-F773-4425-ADF1-8F5679C90B5F}"/>
+          </ac:spMkLst>
+        </pc:spChg>
+        <pc:spChg chg="mod">
+          <ac:chgData name="Manpreet Padam" userId="c774c9fa3d9a7448" providerId="LiveId" clId="{797BF2CA-42B3-4463-95F1-EF67FBB049FC}" dt="2019-10-22T20:03:46.956" v="418" actId="20577"/>
+          <ac:spMkLst>
+            <pc:docMk/>
+            <pc:sldMk cId="3736427872" sldId="274"/>
+            <ac:spMk id="8" creationId="{8D12C32D-A090-45AD-A73D-B2E8879B8BB3}"/>
+          </ac:spMkLst>
+        </pc:spChg>
+        <pc:spChg chg="add del">
+          <ac:chgData name="Manpreet Padam" userId="c774c9fa3d9a7448" providerId="LiveId" clId="{797BF2CA-42B3-4463-95F1-EF67FBB049FC}" dt="2019-10-22T20:03:22.382" v="414"/>
+          <ac:spMkLst>
+            <pc:docMk/>
+            <pc:sldMk cId="3736427872" sldId="274"/>
+            <ac:spMk id="9" creationId="{22CEC6D6-8922-4CD8-866E-6FDAE1A903F3}"/>
+          </ac:spMkLst>
+        </pc:spChg>
+        <pc:spChg chg="add del">
+          <ac:chgData name="Manpreet Padam" userId="c774c9fa3d9a7448" providerId="LiveId" clId="{797BF2CA-42B3-4463-95F1-EF67FBB049FC}" dt="2019-10-22T20:03:22.382" v="414"/>
+          <ac:spMkLst>
+            <pc:docMk/>
+            <pc:sldMk cId="3736427872" sldId="274"/>
+            <ac:spMk id="10" creationId="{2C863D09-EC1B-42CD-8823-C471813CBA6A}"/>
+          </ac:spMkLst>
+        </pc:spChg>
+        <pc:spChg chg="add del">
+          <ac:chgData name="Manpreet Padam" userId="c774c9fa3d9a7448" providerId="LiveId" clId="{797BF2CA-42B3-4463-95F1-EF67FBB049FC}" dt="2019-10-22T20:03:21.469" v="412"/>
+          <ac:spMkLst>
+            <pc:docMk/>
+            <pc:sldMk cId="3736427872" sldId="274"/>
+            <ac:spMk id="12" creationId="{42A77C6A-C243-42AF-8712-4FC8676A93C0}"/>
+          </ac:spMkLst>
+        </pc:spChg>
+        <pc:spChg chg="add del">
+          <ac:chgData name="Manpreet Padam" userId="c774c9fa3d9a7448" providerId="LiveId" clId="{797BF2CA-42B3-4463-95F1-EF67FBB049FC}" dt="2019-10-22T20:03:21.469" v="412"/>
+          <ac:spMkLst>
+            <pc:docMk/>
+            <pc:sldMk cId="3736427872" sldId="274"/>
+            <ac:spMk id="13" creationId="{7D30559F-FAA1-4351-9740-B34003888C36}"/>
+          </ac:spMkLst>
+        </pc:spChg>
+        <pc:picChg chg="mod">
+          <ac:chgData name="Manpreet Padam" userId="c774c9fa3d9a7448" providerId="LiveId" clId="{797BF2CA-42B3-4463-95F1-EF67FBB049FC}" dt="2019-10-22T20:01:25.774" v="406" actId="14826"/>
+          <ac:picMkLst>
+            <pc:docMk/>
+            <pc:sldMk cId="3736427872" sldId="274"/>
+            <ac:picMk id="7" creationId="{A49F0101-3429-45EE-8428-673D8B7E1F65}"/>
+          </ac:picMkLst>
+        </pc:picChg>
+      </pc:sldChg>
+    </pc:docChg>
+  </pc:docChgLst>
+</pc:chgInfo>
 </file>
 
 <file path=ppt/slideLayouts/slideLayout1.xml><?xml version="1.0" encoding="utf-8"?>
@@ -3729,6 +4097,2594 @@
 </p:sld>
 </file>
 
+<file path=ppt/slides/slide10.xml><?xml version="1.0" encoding="utf-8"?>
+<p:sld xmlns:a="http://schemas.openxmlformats.org/drawingml/2006/main" xmlns:r="http://schemas.openxmlformats.org/officeDocument/2006/relationships" xmlns:p="http://schemas.openxmlformats.org/presentationml/2006/main">
+  <p:cSld>
+    <p:bg>
+      <p:bgPr>
+        <a:solidFill>
+          <a:schemeClr val="bg1"/>
+        </a:solidFill>
+        <a:effectLst/>
+      </p:bgPr>
+    </p:bg>
+    <p:spTree>
+      <p:nvGrpSpPr>
+        <p:cNvPr id="1" name=""/>
+        <p:cNvGrpSpPr/>
+        <p:nvPr/>
+      </p:nvGrpSpPr>
+      <p:grpSpPr>
+        <a:xfrm>
+          <a:off x="0" y="0"/>
+          <a:ext cx="0" cy="0"/>
+          <a:chOff x="0" y="0"/>
+          <a:chExt cx="0" cy="0"/>
+        </a:xfrm>
+      </p:grpSpPr>
+      <p:sp>
+        <p:nvSpPr>
+          <p:cNvPr id="21" name="Rectangle 20">
+            <a:extLst>
+              <a:ext uri="{FF2B5EF4-FFF2-40B4-BE49-F238E27FC236}">
+                <a16:creationId xmlns:a16="http://schemas.microsoft.com/office/drawing/2014/main" id="{823AC064-BC96-4F32-8AE1-B2FD38754823}"/>
+              </a:ext>
+              <a:ext uri="{C183D7F6-B498-43B3-948B-1728B52AA6E4}">
+                <adec:decorative xmlns:adec="http://schemas.microsoft.com/office/drawing/2017/decorative" val="1"/>
+              </a:ext>
+            </a:extLst>
+          </p:cNvPr>
+          <p:cNvSpPr>
+            <a:spLocks noGrp="1" noRot="1" noChangeAspect="1" noMove="1" noResize="1" noEditPoints="1" noAdjustHandles="1" noChangeArrowheads="1" noChangeShapeType="1" noTextEdit="1"/>
+          </p:cNvSpPr>
+          <p:nvPr>
+            <p:extLst>
+              <p:ext uri="{386F3935-93C4-4BCD-93E2-E3B085C9AB24}">
+                <p16:designElem xmlns:p16="http://schemas.microsoft.com/office/powerpoint/2015/main" val="1"/>
+              </p:ext>
+            </p:extLst>
+          </p:nvPr>
+        </p:nvSpPr>
+        <p:spPr bwMode="ltGray">
+          <a:xfrm>
+            <a:off x="378068" y="343486"/>
+            <a:ext cx="11438793" cy="1844256"/>
+          </a:xfrm>
+          <a:prstGeom prst="rect">
+            <a:avLst/>
+          </a:prstGeom>
+          <a:solidFill>
+            <a:srgbClr val="404040"/>
+          </a:solidFill>
+          <a:ln w="127000" cap="sq" cmpd="thinThick">
+            <a:solidFill>
+              <a:srgbClr val="404040"/>
+            </a:solidFill>
+          </a:ln>
+        </p:spPr>
+        <p:style>
+          <a:lnRef idx="2">
+            <a:schemeClr val="accent1">
+              <a:shade val="50000"/>
+            </a:schemeClr>
+          </a:lnRef>
+          <a:fillRef idx="1">
+            <a:schemeClr val="accent1"/>
+          </a:fillRef>
+          <a:effectRef idx="0">
+            <a:schemeClr val="accent1"/>
+          </a:effectRef>
+          <a:fontRef idx="minor">
+            <a:schemeClr val="lt1"/>
+          </a:fontRef>
+        </p:style>
+        <p:txBody>
+          <a:bodyPr rtlCol="0" anchor="ctr"/>
+          <a:lstStyle/>
+          <a:p>
+            <a:pPr marL="0" marR="0" lvl="0" indent="0" algn="ctr" defTabSz="914400" rtl="0" eaLnBrk="1" fontAlgn="auto" latinLnBrk="0" hangingPunct="1">
+              <a:lnSpc>
+                <a:spcPct val="100000"/>
+              </a:lnSpc>
+              <a:spcBef>
+                <a:spcPts val="0"/>
+              </a:spcBef>
+              <a:spcAft>
+                <a:spcPts val="0"/>
+              </a:spcAft>
+              <a:buClrTx/>
+              <a:buSzTx/>
+              <a:buFontTx/>
+              <a:buNone/>
+              <a:tabLst/>
+              <a:defRPr/>
+            </a:pPr>
+            <a:endParaRPr kumimoji="0" lang="en-US" sz="1800" b="0" i="0" u="none" strike="noStrike" kern="1200" cap="none" spc="0" normalizeH="0" baseline="0" noProof="0">
+              <a:ln>
+                <a:noFill/>
+              </a:ln>
+              <a:solidFill>
+                <a:prstClr val="white"/>
+              </a:solidFill>
+              <a:effectLst/>
+              <a:uLnTx/>
+              <a:uFillTx/>
+              <a:latin typeface="Calibri" panose="020F0502020204030204"/>
+              <a:ea typeface="+mn-ea"/>
+              <a:cs typeface="+mn-cs"/>
+            </a:endParaRPr>
+          </a:p>
+        </p:txBody>
+      </p:sp>
+      <p:sp>
+        <p:nvSpPr>
+          <p:cNvPr id="3" name="Title 2">
+            <a:extLst>
+              <a:ext uri="{FF2B5EF4-FFF2-40B4-BE49-F238E27FC236}">
+                <a16:creationId xmlns:a16="http://schemas.microsoft.com/office/drawing/2014/main" id="{7472A1B1-DDE7-4029-BF17-FEBDBD755E58}"/>
+              </a:ext>
+            </a:extLst>
+          </p:cNvPr>
+          <p:cNvSpPr>
+            <a:spLocks noGrp="1"/>
+          </p:cNvSpPr>
+          <p:nvPr>
+            <p:ph type="title"/>
+          </p:nvPr>
+        </p:nvSpPr>
+        <p:spPr>
+          <a:xfrm>
+            <a:off x="375139" y="466579"/>
+            <a:ext cx="11290788" cy="1447276"/>
+          </a:xfrm>
+        </p:spPr>
+        <p:txBody>
+          <a:bodyPr vert="horz" lIns="91440" tIns="45720" rIns="91440" bIns="45720" rtlCol="0" anchor="b">
+            <a:normAutofit fontScale="90000"/>
+          </a:bodyPr>
+          <a:lstStyle/>
+          <a:p>
+            <a:pPr algn="ctr"/>
+            <a:br>
+              <a:rPr lang="en-US" sz="3500" dirty="0">
+                <a:solidFill>
+                  <a:srgbClr val="FFFFFF"/>
+                </a:solidFill>
+              </a:rPr>
+            </a:br>
+            <a:r>
+              <a:rPr lang="en-US" sz="3500" dirty="0">
+                <a:solidFill>
+                  <a:srgbClr val="FFFFFF"/>
+                </a:solidFill>
+              </a:rPr>
+              <a:t>Factors that may affect investor sentiment on Bitcoin</a:t>
+            </a:r>
+            <a:br>
+              <a:rPr lang="en-US" sz="3500" dirty="0">
+                <a:solidFill>
+                  <a:srgbClr val="FFFFFF"/>
+                </a:solidFill>
+              </a:rPr>
+            </a:br>
+            <a:br>
+              <a:rPr lang="en-US" sz="3500" dirty="0">
+                <a:solidFill>
+                  <a:srgbClr val="FFFFFF"/>
+                </a:solidFill>
+              </a:rPr>
+            </a:br>
+            <a:endParaRPr lang="en-US" sz="3500" kern="1200" dirty="0">
+              <a:solidFill>
+                <a:srgbClr val="FFFFFF"/>
+              </a:solidFill>
+              <a:latin typeface="+mj-lt"/>
+              <a:ea typeface="+mj-ea"/>
+              <a:cs typeface="+mj-cs"/>
+            </a:endParaRPr>
+          </a:p>
+        </p:txBody>
+      </p:sp>
+      <p:cxnSp>
+        <p:nvCxnSpPr>
+          <p:cNvPr id="23" name="Straight Connector 22">
+            <a:extLst>
+              <a:ext uri="{FF2B5EF4-FFF2-40B4-BE49-F238E27FC236}">
+                <a16:creationId xmlns:a16="http://schemas.microsoft.com/office/drawing/2014/main" id="{7E7C77BC-7138-40B1-A15B-20F57A494629}"/>
+              </a:ext>
+              <a:ext uri="{C183D7F6-B498-43B3-948B-1728B52AA6E4}">
+                <adec:decorative xmlns:adec="http://schemas.microsoft.com/office/drawing/2017/decorative" val="1"/>
+              </a:ext>
+            </a:extLst>
+          </p:cNvPr>
+          <p:cNvCxnSpPr>
+            <a:cxnSpLocks noGrp="1" noRot="1" noChangeAspect="1" noMove="1" noResize="1" noEditPoints="1" noAdjustHandles="1" noChangeArrowheads="1" noChangeShapeType="1"/>
+          </p:cNvCxnSpPr>
+          <p:nvPr>
+            <p:extLst>
+              <p:ext uri="{386F3935-93C4-4BCD-93E2-E3B085C9AB24}">
+                <p16:designElem xmlns:p16="http://schemas.microsoft.com/office/powerpoint/2015/main" val="1"/>
+              </p:ext>
+            </p:extLst>
+          </p:nvPr>
+        </p:nvCxnSpPr>
+        <p:spPr>
+          <a:xfrm>
+            <a:off x="2209800" y="1448631"/>
+            <a:ext cx="7772400" cy="0"/>
+          </a:xfrm>
+          <a:prstGeom prst="line">
+            <a:avLst/>
+          </a:prstGeom>
+          <a:ln w="22225">
+            <a:solidFill>
+              <a:srgbClr val="D9D9D9"/>
+            </a:solidFill>
+          </a:ln>
+        </p:spPr>
+        <p:style>
+          <a:lnRef idx="1">
+            <a:schemeClr val="accent1"/>
+          </a:lnRef>
+          <a:fillRef idx="0">
+            <a:schemeClr val="accent1"/>
+          </a:fillRef>
+          <a:effectRef idx="0">
+            <a:schemeClr val="accent1"/>
+          </a:effectRef>
+          <a:fontRef idx="minor">
+            <a:schemeClr val="tx1"/>
+          </a:fontRef>
+        </p:style>
+      </p:cxnSp>
+      <p:pic>
+        <p:nvPicPr>
+          <p:cNvPr id="11" name="Picture 2" descr="Image result for bitcoin image">
+            <a:extLst>
+              <a:ext uri="{FF2B5EF4-FFF2-40B4-BE49-F238E27FC236}">
+                <a16:creationId xmlns:a16="http://schemas.microsoft.com/office/drawing/2014/main" id="{28C2E534-3A8A-4160-808C-C5EA5EE7195A}"/>
+              </a:ext>
+            </a:extLst>
+          </p:cNvPr>
+          <p:cNvPicPr>
+            <a:picLocks noChangeAspect="1" noChangeArrowheads="1"/>
+          </p:cNvPicPr>
+          <p:nvPr/>
+        </p:nvPicPr>
+        <p:blipFill rotWithShape="1">
+          <a:blip r:embed="rId2">
+            <a:extLst>
+              <a:ext uri="{28A0092B-C50C-407E-A947-70E740481C1C}">
+                <a14:useLocalDpi xmlns:a14="http://schemas.microsoft.com/office/drawing/2010/main" val="0"/>
+              </a:ext>
+            </a:extLst>
+          </a:blip>
+          <a:srcRect l="20360" r="5403" b="-3"/>
+          <a:stretch/>
+        </p:blipFill>
+        <p:spPr bwMode="auto">
+          <a:xfrm>
+            <a:off x="10628232" y="5484694"/>
+            <a:ext cx="1433628" cy="1289082"/>
+          </a:xfrm>
+          <a:prstGeom prst="rect">
+            <a:avLst/>
+          </a:prstGeom>
+          <a:extLst>
+            <a:ext uri="{909E8E84-426E-40DD-AFC4-6F175D3DCCD1}">
+              <a14:hiddenFill xmlns:a14="http://schemas.microsoft.com/office/drawing/2010/main">
+                <a:solidFill>
+                  <a:srgbClr val="FFFFFF"/>
+                </a:solidFill>
+              </a14:hiddenFill>
+            </a:ext>
+          </a:extLst>
+        </p:spPr>
+      </p:pic>
+      <p:pic>
+        <p:nvPicPr>
+          <p:cNvPr id="7" name="Content Placeholder 6">
+            <a:extLst>
+              <a:ext uri="{FF2B5EF4-FFF2-40B4-BE49-F238E27FC236}">
+                <a16:creationId xmlns:a16="http://schemas.microsoft.com/office/drawing/2014/main" id="{A49F0101-3429-45EE-8428-673D8B7E1F65}"/>
+              </a:ext>
+            </a:extLst>
+          </p:cNvPr>
+          <p:cNvPicPr>
+            <a:picLocks noGrp="1" noChangeAspect="1"/>
+          </p:cNvPicPr>
+          <p:nvPr>
+            <p:ph idx="1"/>
+          </p:nvPr>
+        </p:nvPicPr>
+        <p:blipFill>
+          <a:blip r:embed="rId3">
+            <a:extLst>
+              <a:ext uri="{28A0092B-C50C-407E-A947-70E740481C1C}">
+                <a14:useLocalDpi xmlns:a14="http://schemas.microsoft.com/office/drawing/2010/main" val="0"/>
+              </a:ext>
+            </a:extLst>
+          </a:blip>
+          <a:srcRect/>
+          <a:stretch/>
+        </p:blipFill>
+        <p:spPr>
+          <a:xfrm>
+            <a:off x="501407" y="2314009"/>
+            <a:ext cx="9539290" cy="4099137"/>
+          </a:xfrm>
+        </p:spPr>
+      </p:pic>
+      <p:sp>
+        <p:nvSpPr>
+          <p:cNvPr id="8" name="Rectangle 7">
+            <a:extLst>
+              <a:ext uri="{FF2B5EF4-FFF2-40B4-BE49-F238E27FC236}">
+                <a16:creationId xmlns:a16="http://schemas.microsoft.com/office/drawing/2014/main" id="{B11BA722-066A-473D-999F-A5F801118C94}"/>
+              </a:ext>
+            </a:extLst>
+          </p:cNvPr>
+          <p:cNvSpPr/>
+          <p:nvPr/>
+        </p:nvSpPr>
+        <p:spPr>
+          <a:xfrm>
+            <a:off x="7976152" y="3215308"/>
+            <a:ext cx="4015408" cy="646331"/>
+          </a:xfrm>
+          <a:prstGeom prst="rect">
+            <a:avLst/>
+          </a:prstGeom>
+        </p:spPr>
+        <p:txBody>
+          <a:bodyPr wrap="square">
+            <a:spAutoFit/>
+          </a:bodyPr>
+          <a:lstStyle/>
+          <a:p>
+            <a:pPr algn="just"/>
+            <a:r>
+              <a:rPr lang="en-US" dirty="0"/>
+              <a:t>The mean value of a transfer has diminished compared to early years.</a:t>
+            </a:r>
+            <a:endParaRPr lang="en-US" sz="3000" dirty="0"/>
+          </a:p>
+        </p:txBody>
+      </p:sp>
+    </p:spTree>
+    <p:extLst>
+      <p:ext uri="{BB962C8B-B14F-4D97-AF65-F5344CB8AC3E}">
+        <p14:creationId xmlns:p14="http://schemas.microsoft.com/office/powerpoint/2010/main" val="2912251798"/>
+      </p:ext>
+    </p:extLst>
+  </p:cSld>
+  <p:clrMapOvr>
+    <a:masterClrMapping/>
+  </p:clrMapOvr>
+</p:sld>
+</file>
+
+<file path=ppt/slides/slide11.xml><?xml version="1.0" encoding="utf-8"?>
+<p:sld xmlns:a="http://schemas.openxmlformats.org/drawingml/2006/main" xmlns:r="http://schemas.openxmlformats.org/officeDocument/2006/relationships" xmlns:p="http://schemas.openxmlformats.org/presentationml/2006/main">
+  <p:cSld>
+    <p:bg>
+      <p:bgPr>
+        <a:solidFill>
+          <a:schemeClr val="bg1"/>
+        </a:solidFill>
+        <a:effectLst/>
+      </p:bgPr>
+    </p:bg>
+    <p:spTree>
+      <p:nvGrpSpPr>
+        <p:cNvPr id="1" name=""/>
+        <p:cNvGrpSpPr/>
+        <p:nvPr/>
+      </p:nvGrpSpPr>
+      <p:grpSpPr>
+        <a:xfrm>
+          <a:off x="0" y="0"/>
+          <a:ext cx="0" cy="0"/>
+          <a:chOff x="0" y="0"/>
+          <a:chExt cx="0" cy="0"/>
+        </a:xfrm>
+      </p:grpSpPr>
+      <p:sp>
+        <p:nvSpPr>
+          <p:cNvPr id="21" name="Rectangle 20">
+            <a:extLst>
+              <a:ext uri="{FF2B5EF4-FFF2-40B4-BE49-F238E27FC236}">
+                <a16:creationId xmlns:a16="http://schemas.microsoft.com/office/drawing/2014/main" id="{823AC064-BC96-4F32-8AE1-B2FD38754823}"/>
+              </a:ext>
+              <a:ext uri="{C183D7F6-B498-43B3-948B-1728B52AA6E4}">
+                <adec:decorative xmlns:adec="http://schemas.microsoft.com/office/drawing/2017/decorative" val="1"/>
+              </a:ext>
+            </a:extLst>
+          </p:cNvPr>
+          <p:cNvSpPr>
+            <a:spLocks noGrp="1" noRot="1" noChangeAspect="1" noMove="1" noResize="1" noEditPoints="1" noAdjustHandles="1" noChangeArrowheads="1" noChangeShapeType="1" noTextEdit="1"/>
+          </p:cNvSpPr>
+          <p:nvPr>
+            <p:extLst>
+              <p:ext uri="{386F3935-93C4-4BCD-93E2-E3B085C9AB24}">
+                <p16:designElem xmlns:p16="http://schemas.microsoft.com/office/powerpoint/2015/main" val="1"/>
+              </p:ext>
+            </p:extLst>
+          </p:nvPr>
+        </p:nvSpPr>
+        <p:spPr bwMode="ltGray">
+          <a:xfrm>
+            <a:off x="378068" y="343486"/>
+            <a:ext cx="11438793" cy="1844256"/>
+          </a:xfrm>
+          <a:prstGeom prst="rect">
+            <a:avLst/>
+          </a:prstGeom>
+          <a:solidFill>
+            <a:srgbClr val="404040"/>
+          </a:solidFill>
+          <a:ln w="127000" cap="sq" cmpd="thinThick">
+            <a:solidFill>
+              <a:srgbClr val="404040"/>
+            </a:solidFill>
+          </a:ln>
+        </p:spPr>
+        <p:style>
+          <a:lnRef idx="2">
+            <a:schemeClr val="accent1">
+              <a:shade val="50000"/>
+            </a:schemeClr>
+          </a:lnRef>
+          <a:fillRef idx="1">
+            <a:schemeClr val="accent1"/>
+          </a:fillRef>
+          <a:effectRef idx="0">
+            <a:schemeClr val="accent1"/>
+          </a:effectRef>
+          <a:fontRef idx="minor">
+            <a:schemeClr val="lt1"/>
+          </a:fontRef>
+        </p:style>
+        <p:txBody>
+          <a:bodyPr rtlCol="0" anchor="ctr"/>
+          <a:lstStyle/>
+          <a:p>
+            <a:pPr marL="0" marR="0" lvl="0" indent="0" algn="ctr" defTabSz="914400" rtl="0" eaLnBrk="1" fontAlgn="auto" latinLnBrk="0" hangingPunct="1">
+              <a:lnSpc>
+                <a:spcPct val="100000"/>
+              </a:lnSpc>
+              <a:spcBef>
+                <a:spcPts val="0"/>
+              </a:spcBef>
+              <a:spcAft>
+                <a:spcPts val="0"/>
+              </a:spcAft>
+              <a:buClrTx/>
+              <a:buSzTx/>
+              <a:buFontTx/>
+              <a:buNone/>
+              <a:tabLst/>
+              <a:defRPr/>
+            </a:pPr>
+            <a:endParaRPr kumimoji="0" lang="en-US" sz="1800" b="0" i="0" u="none" strike="noStrike" kern="1200" cap="none" spc="0" normalizeH="0" baseline="0" noProof="0">
+              <a:ln>
+                <a:noFill/>
+              </a:ln>
+              <a:solidFill>
+                <a:prstClr val="white"/>
+              </a:solidFill>
+              <a:effectLst/>
+              <a:uLnTx/>
+              <a:uFillTx/>
+              <a:latin typeface="Calibri" panose="020F0502020204030204"/>
+              <a:ea typeface="+mn-ea"/>
+              <a:cs typeface="+mn-cs"/>
+            </a:endParaRPr>
+          </a:p>
+        </p:txBody>
+      </p:sp>
+      <p:sp>
+        <p:nvSpPr>
+          <p:cNvPr id="3" name="Title 2">
+            <a:extLst>
+              <a:ext uri="{FF2B5EF4-FFF2-40B4-BE49-F238E27FC236}">
+                <a16:creationId xmlns:a16="http://schemas.microsoft.com/office/drawing/2014/main" id="{7472A1B1-DDE7-4029-BF17-FEBDBD755E58}"/>
+              </a:ext>
+            </a:extLst>
+          </p:cNvPr>
+          <p:cNvSpPr>
+            <a:spLocks noGrp="1"/>
+          </p:cNvSpPr>
+          <p:nvPr>
+            <p:ph type="title"/>
+          </p:nvPr>
+        </p:nvSpPr>
+        <p:spPr>
+          <a:xfrm>
+            <a:off x="375139" y="466579"/>
+            <a:ext cx="11290788" cy="1447276"/>
+          </a:xfrm>
+        </p:spPr>
+        <p:txBody>
+          <a:bodyPr vert="horz" lIns="91440" tIns="45720" rIns="91440" bIns="45720" rtlCol="0" anchor="b">
+            <a:normAutofit fontScale="90000"/>
+          </a:bodyPr>
+          <a:lstStyle/>
+          <a:p>
+            <a:pPr algn="ctr"/>
+            <a:br>
+              <a:rPr lang="en-US" sz="3500" dirty="0">
+                <a:solidFill>
+                  <a:srgbClr val="FFFFFF"/>
+                </a:solidFill>
+              </a:rPr>
+            </a:br>
+            <a:r>
+              <a:rPr lang="en-US" sz="3500" dirty="0">
+                <a:solidFill>
+                  <a:srgbClr val="FFFFFF"/>
+                </a:solidFill>
+              </a:rPr>
+              <a:t>Factors that may affect investor sentiment on Bitcoin</a:t>
+            </a:r>
+            <a:br>
+              <a:rPr lang="en-US" sz="3500" dirty="0">
+                <a:solidFill>
+                  <a:srgbClr val="FFFFFF"/>
+                </a:solidFill>
+              </a:rPr>
+            </a:br>
+            <a:br>
+              <a:rPr lang="en-US" sz="3500" dirty="0">
+                <a:solidFill>
+                  <a:srgbClr val="FFFFFF"/>
+                </a:solidFill>
+              </a:rPr>
+            </a:br>
+            <a:endParaRPr lang="en-US" sz="3500" kern="1200" dirty="0">
+              <a:solidFill>
+                <a:srgbClr val="FFFFFF"/>
+              </a:solidFill>
+              <a:latin typeface="+mj-lt"/>
+              <a:ea typeface="+mj-ea"/>
+              <a:cs typeface="+mj-cs"/>
+            </a:endParaRPr>
+          </a:p>
+        </p:txBody>
+      </p:sp>
+      <p:cxnSp>
+        <p:nvCxnSpPr>
+          <p:cNvPr id="23" name="Straight Connector 22">
+            <a:extLst>
+              <a:ext uri="{FF2B5EF4-FFF2-40B4-BE49-F238E27FC236}">
+                <a16:creationId xmlns:a16="http://schemas.microsoft.com/office/drawing/2014/main" id="{7E7C77BC-7138-40B1-A15B-20F57A494629}"/>
+              </a:ext>
+              <a:ext uri="{C183D7F6-B498-43B3-948B-1728B52AA6E4}">
+                <adec:decorative xmlns:adec="http://schemas.microsoft.com/office/drawing/2017/decorative" val="1"/>
+              </a:ext>
+            </a:extLst>
+          </p:cNvPr>
+          <p:cNvCxnSpPr>
+            <a:cxnSpLocks noGrp="1" noRot="1" noChangeAspect="1" noMove="1" noResize="1" noEditPoints="1" noAdjustHandles="1" noChangeArrowheads="1" noChangeShapeType="1"/>
+          </p:cNvCxnSpPr>
+          <p:nvPr>
+            <p:extLst>
+              <p:ext uri="{386F3935-93C4-4BCD-93E2-E3B085C9AB24}">
+                <p16:designElem xmlns:p16="http://schemas.microsoft.com/office/powerpoint/2015/main" val="1"/>
+              </p:ext>
+            </p:extLst>
+          </p:nvPr>
+        </p:nvCxnSpPr>
+        <p:spPr>
+          <a:xfrm>
+            <a:off x="2209800" y="1448631"/>
+            <a:ext cx="7772400" cy="0"/>
+          </a:xfrm>
+          <a:prstGeom prst="line">
+            <a:avLst/>
+          </a:prstGeom>
+          <a:ln w="22225">
+            <a:solidFill>
+              <a:srgbClr val="D9D9D9"/>
+            </a:solidFill>
+          </a:ln>
+        </p:spPr>
+        <p:style>
+          <a:lnRef idx="1">
+            <a:schemeClr val="accent1"/>
+          </a:lnRef>
+          <a:fillRef idx="0">
+            <a:schemeClr val="accent1"/>
+          </a:fillRef>
+          <a:effectRef idx="0">
+            <a:schemeClr val="accent1"/>
+          </a:effectRef>
+          <a:fontRef idx="minor">
+            <a:schemeClr val="tx1"/>
+          </a:fontRef>
+        </p:style>
+      </p:cxnSp>
+      <p:pic>
+        <p:nvPicPr>
+          <p:cNvPr id="11" name="Picture 2" descr="Image result for bitcoin image">
+            <a:extLst>
+              <a:ext uri="{FF2B5EF4-FFF2-40B4-BE49-F238E27FC236}">
+                <a16:creationId xmlns:a16="http://schemas.microsoft.com/office/drawing/2014/main" id="{28C2E534-3A8A-4160-808C-C5EA5EE7195A}"/>
+              </a:ext>
+            </a:extLst>
+          </p:cNvPr>
+          <p:cNvPicPr>
+            <a:picLocks noChangeAspect="1" noChangeArrowheads="1"/>
+          </p:cNvPicPr>
+          <p:nvPr/>
+        </p:nvPicPr>
+        <p:blipFill rotWithShape="1">
+          <a:blip r:embed="rId2">
+            <a:extLst>
+              <a:ext uri="{28A0092B-C50C-407E-A947-70E740481C1C}">
+                <a14:useLocalDpi xmlns:a14="http://schemas.microsoft.com/office/drawing/2010/main" val="0"/>
+              </a:ext>
+            </a:extLst>
+          </a:blip>
+          <a:srcRect l="20360" r="5403" b="-3"/>
+          <a:stretch/>
+        </p:blipFill>
+        <p:spPr bwMode="auto">
+          <a:xfrm>
+            <a:off x="10628232" y="5484694"/>
+            <a:ext cx="1433628" cy="1289082"/>
+          </a:xfrm>
+          <a:prstGeom prst="rect">
+            <a:avLst/>
+          </a:prstGeom>
+          <a:extLst>
+            <a:ext uri="{909E8E84-426E-40DD-AFC4-6F175D3DCCD1}">
+              <a14:hiddenFill xmlns:a14="http://schemas.microsoft.com/office/drawing/2010/main">
+                <a:solidFill>
+                  <a:srgbClr val="FFFFFF"/>
+                </a:solidFill>
+              </a14:hiddenFill>
+            </a:ext>
+          </a:extLst>
+        </p:spPr>
+      </p:pic>
+      <p:pic>
+        <p:nvPicPr>
+          <p:cNvPr id="7" name="Content Placeholder 6">
+            <a:extLst>
+              <a:ext uri="{FF2B5EF4-FFF2-40B4-BE49-F238E27FC236}">
+                <a16:creationId xmlns:a16="http://schemas.microsoft.com/office/drawing/2014/main" id="{A49F0101-3429-45EE-8428-673D8B7E1F65}"/>
+              </a:ext>
+            </a:extLst>
+          </p:cNvPr>
+          <p:cNvPicPr>
+            <a:picLocks noGrp="1" noChangeAspect="1"/>
+          </p:cNvPicPr>
+          <p:nvPr>
+            <p:ph idx="1"/>
+          </p:nvPr>
+        </p:nvPicPr>
+        <p:blipFill>
+          <a:blip r:embed="rId3">
+            <a:extLst>
+              <a:ext uri="{28A0092B-C50C-407E-A947-70E740481C1C}">
+                <a14:useLocalDpi xmlns:a14="http://schemas.microsoft.com/office/drawing/2010/main" val="0"/>
+              </a:ext>
+            </a:extLst>
+          </a:blip>
+          <a:srcRect/>
+          <a:stretch/>
+        </p:blipFill>
+        <p:spPr>
+          <a:xfrm>
+            <a:off x="531131" y="2314009"/>
+            <a:ext cx="9479842" cy="4099137"/>
+          </a:xfrm>
+        </p:spPr>
+      </p:pic>
+      <p:sp>
+        <p:nvSpPr>
+          <p:cNvPr id="8" name="Rectangle 7">
+            <a:extLst>
+              <a:ext uri="{FF2B5EF4-FFF2-40B4-BE49-F238E27FC236}">
+                <a16:creationId xmlns:a16="http://schemas.microsoft.com/office/drawing/2014/main" id="{8D12C32D-A090-45AD-A73D-B2E8879B8BB3}"/>
+              </a:ext>
+            </a:extLst>
+          </p:cNvPr>
+          <p:cNvSpPr/>
+          <p:nvPr/>
+        </p:nvSpPr>
+        <p:spPr>
+          <a:xfrm>
+            <a:off x="7976152" y="3215308"/>
+            <a:ext cx="4015408" cy="369332"/>
+          </a:xfrm>
+          <a:prstGeom prst="rect">
+            <a:avLst/>
+          </a:prstGeom>
+        </p:spPr>
+        <p:txBody>
+          <a:bodyPr wrap="square">
+            <a:spAutoFit/>
+          </a:bodyPr>
+          <a:lstStyle/>
+          <a:p>
+            <a:pPr algn="just"/>
+            <a:r>
+              <a:rPr lang="en-US" dirty="0"/>
+              <a:t>The median value of a transfer.</a:t>
+            </a:r>
+            <a:endParaRPr lang="en-US" sz="3000" dirty="0"/>
+          </a:p>
+        </p:txBody>
+      </p:sp>
+    </p:spTree>
+    <p:extLst>
+      <p:ext uri="{BB962C8B-B14F-4D97-AF65-F5344CB8AC3E}">
+        <p14:creationId xmlns:p14="http://schemas.microsoft.com/office/powerpoint/2010/main" val="694198128"/>
+      </p:ext>
+    </p:extLst>
+  </p:cSld>
+  <p:clrMapOvr>
+    <a:masterClrMapping/>
+  </p:clrMapOvr>
+</p:sld>
+</file>
+
+<file path=ppt/slides/slide12.xml><?xml version="1.0" encoding="utf-8"?>
+<p:sld xmlns:a="http://schemas.openxmlformats.org/drawingml/2006/main" xmlns:r="http://schemas.openxmlformats.org/officeDocument/2006/relationships" xmlns:p="http://schemas.openxmlformats.org/presentationml/2006/main">
+  <p:cSld>
+    <p:bg>
+      <p:bgPr>
+        <a:solidFill>
+          <a:schemeClr val="bg1"/>
+        </a:solidFill>
+        <a:effectLst/>
+      </p:bgPr>
+    </p:bg>
+    <p:spTree>
+      <p:nvGrpSpPr>
+        <p:cNvPr id="1" name=""/>
+        <p:cNvGrpSpPr/>
+        <p:nvPr/>
+      </p:nvGrpSpPr>
+      <p:grpSpPr>
+        <a:xfrm>
+          <a:off x="0" y="0"/>
+          <a:ext cx="0" cy="0"/>
+          <a:chOff x="0" y="0"/>
+          <a:chExt cx="0" cy="0"/>
+        </a:xfrm>
+      </p:grpSpPr>
+      <p:sp>
+        <p:nvSpPr>
+          <p:cNvPr id="21" name="Rectangle 20">
+            <a:extLst>
+              <a:ext uri="{FF2B5EF4-FFF2-40B4-BE49-F238E27FC236}">
+                <a16:creationId xmlns:a16="http://schemas.microsoft.com/office/drawing/2014/main" id="{823AC064-BC96-4F32-8AE1-B2FD38754823}"/>
+              </a:ext>
+              <a:ext uri="{C183D7F6-B498-43B3-948B-1728B52AA6E4}">
+                <adec:decorative xmlns:adec="http://schemas.microsoft.com/office/drawing/2017/decorative" val="1"/>
+              </a:ext>
+            </a:extLst>
+          </p:cNvPr>
+          <p:cNvSpPr>
+            <a:spLocks noGrp="1" noRot="1" noChangeAspect="1" noMove="1" noResize="1" noEditPoints="1" noAdjustHandles="1" noChangeArrowheads="1" noChangeShapeType="1" noTextEdit="1"/>
+          </p:cNvSpPr>
+          <p:nvPr>
+            <p:extLst>
+              <p:ext uri="{386F3935-93C4-4BCD-93E2-E3B085C9AB24}">
+                <p16:designElem xmlns:p16="http://schemas.microsoft.com/office/powerpoint/2015/main" val="1"/>
+              </p:ext>
+            </p:extLst>
+          </p:nvPr>
+        </p:nvSpPr>
+        <p:spPr bwMode="ltGray">
+          <a:xfrm>
+            <a:off x="378068" y="343486"/>
+            <a:ext cx="11438793" cy="1844256"/>
+          </a:xfrm>
+          <a:prstGeom prst="rect">
+            <a:avLst/>
+          </a:prstGeom>
+          <a:solidFill>
+            <a:srgbClr val="404040"/>
+          </a:solidFill>
+          <a:ln w="127000" cap="sq" cmpd="thinThick">
+            <a:solidFill>
+              <a:srgbClr val="404040"/>
+            </a:solidFill>
+          </a:ln>
+        </p:spPr>
+        <p:style>
+          <a:lnRef idx="2">
+            <a:schemeClr val="accent1">
+              <a:shade val="50000"/>
+            </a:schemeClr>
+          </a:lnRef>
+          <a:fillRef idx="1">
+            <a:schemeClr val="accent1"/>
+          </a:fillRef>
+          <a:effectRef idx="0">
+            <a:schemeClr val="accent1"/>
+          </a:effectRef>
+          <a:fontRef idx="minor">
+            <a:schemeClr val="lt1"/>
+          </a:fontRef>
+        </p:style>
+        <p:txBody>
+          <a:bodyPr rtlCol="0" anchor="ctr"/>
+          <a:lstStyle/>
+          <a:p>
+            <a:pPr marL="0" marR="0" lvl="0" indent="0" algn="ctr" defTabSz="914400" rtl="0" eaLnBrk="1" fontAlgn="auto" latinLnBrk="0" hangingPunct="1">
+              <a:lnSpc>
+                <a:spcPct val="100000"/>
+              </a:lnSpc>
+              <a:spcBef>
+                <a:spcPts val="0"/>
+              </a:spcBef>
+              <a:spcAft>
+                <a:spcPts val="0"/>
+              </a:spcAft>
+              <a:buClrTx/>
+              <a:buSzTx/>
+              <a:buFontTx/>
+              <a:buNone/>
+              <a:tabLst/>
+              <a:defRPr/>
+            </a:pPr>
+            <a:endParaRPr kumimoji="0" lang="en-US" sz="1800" b="0" i="0" u="none" strike="noStrike" kern="1200" cap="none" spc="0" normalizeH="0" baseline="0" noProof="0">
+              <a:ln>
+                <a:noFill/>
+              </a:ln>
+              <a:solidFill>
+                <a:prstClr val="white"/>
+              </a:solidFill>
+              <a:effectLst/>
+              <a:uLnTx/>
+              <a:uFillTx/>
+              <a:latin typeface="Calibri" panose="020F0502020204030204"/>
+              <a:ea typeface="+mn-ea"/>
+              <a:cs typeface="+mn-cs"/>
+            </a:endParaRPr>
+          </a:p>
+        </p:txBody>
+      </p:sp>
+      <p:sp>
+        <p:nvSpPr>
+          <p:cNvPr id="3" name="Title 2">
+            <a:extLst>
+              <a:ext uri="{FF2B5EF4-FFF2-40B4-BE49-F238E27FC236}">
+                <a16:creationId xmlns:a16="http://schemas.microsoft.com/office/drawing/2014/main" id="{7472A1B1-DDE7-4029-BF17-FEBDBD755E58}"/>
+              </a:ext>
+            </a:extLst>
+          </p:cNvPr>
+          <p:cNvSpPr>
+            <a:spLocks noGrp="1"/>
+          </p:cNvSpPr>
+          <p:nvPr>
+            <p:ph type="title"/>
+          </p:nvPr>
+        </p:nvSpPr>
+        <p:spPr>
+          <a:xfrm>
+            <a:off x="375139" y="466579"/>
+            <a:ext cx="11290788" cy="1447276"/>
+          </a:xfrm>
+        </p:spPr>
+        <p:txBody>
+          <a:bodyPr vert="horz" lIns="91440" tIns="45720" rIns="91440" bIns="45720" rtlCol="0" anchor="b">
+            <a:normAutofit fontScale="90000"/>
+          </a:bodyPr>
+          <a:lstStyle/>
+          <a:p>
+            <a:pPr algn="ctr"/>
+            <a:br>
+              <a:rPr lang="en-US" sz="3500" dirty="0">
+                <a:solidFill>
+                  <a:srgbClr val="FFFFFF"/>
+                </a:solidFill>
+              </a:rPr>
+            </a:br>
+            <a:r>
+              <a:rPr lang="en-US" sz="3500" dirty="0">
+                <a:solidFill>
+                  <a:srgbClr val="FFFFFF"/>
+                </a:solidFill>
+              </a:rPr>
+              <a:t>Factors that may affect investor sentiment on Bitcoin</a:t>
+            </a:r>
+            <a:br>
+              <a:rPr lang="en-US" sz="3500" dirty="0">
+                <a:solidFill>
+                  <a:srgbClr val="FFFFFF"/>
+                </a:solidFill>
+              </a:rPr>
+            </a:br>
+            <a:br>
+              <a:rPr lang="en-US" sz="3500" dirty="0">
+                <a:solidFill>
+                  <a:srgbClr val="FFFFFF"/>
+                </a:solidFill>
+              </a:rPr>
+            </a:br>
+            <a:endParaRPr lang="en-US" sz="3500" kern="1200" dirty="0">
+              <a:solidFill>
+                <a:srgbClr val="FFFFFF"/>
+              </a:solidFill>
+              <a:latin typeface="+mj-lt"/>
+              <a:ea typeface="+mj-ea"/>
+              <a:cs typeface="+mj-cs"/>
+            </a:endParaRPr>
+          </a:p>
+        </p:txBody>
+      </p:sp>
+      <p:cxnSp>
+        <p:nvCxnSpPr>
+          <p:cNvPr id="23" name="Straight Connector 22">
+            <a:extLst>
+              <a:ext uri="{FF2B5EF4-FFF2-40B4-BE49-F238E27FC236}">
+                <a16:creationId xmlns:a16="http://schemas.microsoft.com/office/drawing/2014/main" id="{7E7C77BC-7138-40B1-A15B-20F57A494629}"/>
+              </a:ext>
+              <a:ext uri="{C183D7F6-B498-43B3-948B-1728B52AA6E4}">
+                <adec:decorative xmlns:adec="http://schemas.microsoft.com/office/drawing/2017/decorative" val="1"/>
+              </a:ext>
+            </a:extLst>
+          </p:cNvPr>
+          <p:cNvCxnSpPr>
+            <a:cxnSpLocks noGrp="1" noRot="1" noChangeAspect="1" noMove="1" noResize="1" noEditPoints="1" noAdjustHandles="1" noChangeArrowheads="1" noChangeShapeType="1"/>
+          </p:cNvCxnSpPr>
+          <p:nvPr>
+            <p:extLst>
+              <p:ext uri="{386F3935-93C4-4BCD-93E2-E3B085C9AB24}">
+                <p16:designElem xmlns:p16="http://schemas.microsoft.com/office/powerpoint/2015/main" val="1"/>
+              </p:ext>
+            </p:extLst>
+          </p:nvPr>
+        </p:nvCxnSpPr>
+        <p:spPr>
+          <a:xfrm>
+            <a:off x="2209800" y="1448631"/>
+            <a:ext cx="7772400" cy="0"/>
+          </a:xfrm>
+          <a:prstGeom prst="line">
+            <a:avLst/>
+          </a:prstGeom>
+          <a:ln w="22225">
+            <a:solidFill>
+              <a:srgbClr val="D9D9D9"/>
+            </a:solidFill>
+          </a:ln>
+        </p:spPr>
+        <p:style>
+          <a:lnRef idx="1">
+            <a:schemeClr val="accent1"/>
+          </a:lnRef>
+          <a:fillRef idx="0">
+            <a:schemeClr val="accent1"/>
+          </a:fillRef>
+          <a:effectRef idx="0">
+            <a:schemeClr val="accent1"/>
+          </a:effectRef>
+          <a:fontRef idx="minor">
+            <a:schemeClr val="tx1"/>
+          </a:fontRef>
+        </p:style>
+      </p:cxnSp>
+      <p:pic>
+        <p:nvPicPr>
+          <p:cNvPr id="11" name="Picture 2" descr="Image result for bitcoin image">
+            <a:extLst>
+              <a:ext uri="{FF2B5EF4-FFF2-40B4-BE49-F238E27FC236}">
+                <a16:creationId xmlns:a16="http://schemas.microsoft.com/office/drawing/2014/main" id="{28C2E534-3A8A-4160-808C-C5EA5EE7195A}"/>
+              </a:ext>
+            </a:extLst>
+          </p:cNvPr>
+          <p:cNvPicPr>
+            <a:picLocks noChangeAspect="1" noChangeArrowheads="1"/>
+          </p:cNvPicPr>
+          <p:nvPr/>
+        </p:nvPicPr>
+        <p:blipFill rotWithShape="1">
+          <a:blip r:embed="rId2">
+            <a:extLst>
+              <a:ext uri="{28A0092B-C50C-407E-A947-70E740481C1C}">
+                <a14:useLocalDpi xmlns:a14="http://schemas.microsoft.com/office/drawing/2010/main" val="0"/>
+              </a:ext>
+            </a:extLst>
+          </a:blip>
+          <a:srcRect l="20360" r="5403" b="-3"/>
+          <a:stretch/>
+        </p:blipFill>
+        <p:spPr bwMode="auto">
+          <a:xfrm>
+            <a:off x="10628232" y="5484694"/>
+            <a:ext cx="1433628" cy="1289082"/>
+          </a:xfrm>
+          <a:prstGeom prst="rect">
+            <a:avLst/>
+          </a:prstGeom>
+          <a:extLst>
+            <a:ext uri="{909E8E84-426E-40DD-AFC4-6F175D3DCCD1}">
+              <a14:hiddenFill xmlns:a14="http://schemas.microsoft.com/office/drawing/2010/main">
+                <a:solidFill>
+                  <a:srgbClr val="FFFFFF"/>
+                </a:solidFill>
+              </a14:hiddenFill>
+            </a:ext>
+          </a:extLst>
+        </p:spPr>
+      </p:pic>
+      <p:pic>
+        <p:nvPicPr>
+          <p:cNvPr id="7" name="Content Placeholder 6">
+            <a:extLst>
+              <a:ext uri="{FF2B5EF4-FFF2-40B4-BE49-F238E27FC236}">
+                <a16:creationId xmlns:a16="http://schemas.microsoft.com/office/drawing/2014/main" id="{A49F0101-3429-45EE-8428-673D8B7E1F65}"/>
+              </a:ext>
+            </a:extLst>
+          </p:cNvPr>
+          <p:cNvPicPr>
+            <a:picLocks noGrp="1" noChangeAspect="1"/>
+          </p:cNvPicPr>
+          <p:nvPr>
+            <p:ph idx="1"/>
+          </p:nvPr>
+        </p:nvPicPr>
+        <p:blipFill>
+          <a:blip r:embed="rId3">
+            <a:extLst>
+              <a:ext uri="{28A0092B-C50C-407E-A947-70E740481C1C}">
+                <a14:useLocalDpi xmlns:a14="http://schemas.microsoft.com/office/drawing/2010/main" val="0"/>
+              </a:ext>
+            </a:extLst>
+          </a:blip>
+          <a:srcRect/>
+          <a:stretch/>
+        </p:blipFill>
+        <p:spPr>
+          <a:xfrm>
+            <a:off x="531131" y="2319831"/>
+            <a:ext cx="9479842" cy="4087493"/>
+          </a:xfrm>
+        </p:spPr>
+      </p:pic>
+      <p:sp>
+        <p:nvSpPr>
+          <p:cNvPr id="8" name="Rectangle 7">
+            <a:extLst>
+              <a:ext uri="{FF2B5EF4-FFF2-40B4-BE49-F238E27FC236}">
+                <a16:creationId xmlns:a16="http://schemas.microsoft.com/office/drawing/2014/main" id="{8D12C32D-A090-45AD-A73D-B2E8879B8BB3}"/>
+              </a:ext>
+            </a:extLst>
+          </p:cNvPr>
+          <p:cNvSpPr/>
+          <p:nvPr/>
+        </p:nvSpPr>
+        <p:spPr>
+          <a:xfrm>
+            <a:off x="7976152" y="3215308"/>
+            <a:ext cx="4015408" cy="2031325"/>
+          </a:xfrm>
+          <a:prstGeom prst="rect">
+            <a:avLst/>
+          </a:prstGeom>
+        </p:spPr>
+        <p:txBody>
+          <a:bodyPr wrap="square">
+            <a:spAutoFit/>
+          </a:bodyPr>
+          <a:lstStyle/>
+          <a:p>
+            <a:pPr algn="just"/>
+            <a:r>
+              <a:rPr lang="en-US" dirty="0"/>
+              <a:t>Non-</a:t>
+            </a:r>
+            <a:r>
+              <a:rPr lang="en-US" dirty="0" err="1"/>
+              <a:t>Zero_Count</a:t>
+            </a:r>
+            <a:r>
+              <a:rPr lang="en-US" dirty="0"/>
+              <a:t> represents the number of unique non-zero addresses holding a positive (non-zero) amount of coins.</a:t>
+            </a:r>
+          </a:p>
+          <a:p>
+            <a:pPr algn="just"/>
+            <a:endParaRPr lang="en-US" dirty="0"/>
+          </a:p>
+          <a:p>
+            <a:pPr algn="just"/>
+            <a:r>
+              <a:rPr lang="en-US" dirty="0"/>
+              <a:t>Min_Point_1_Coin represents the number of addresses that holds at least 0.1 coin.</a:t>
+            </a:r>
+            <a:endParaRPr lang="en-US" sz="3000" dirty="0"/>
+          </a:p>
+        </p:txBody>
+      </p:sp>
+    </p:spTree>
+    <p:extLst>
+      <p:ext uri="{BB962C8B-B14F-4D97-AF65-F5344CB8AC3E}">
+        <p14:creationId xmlns:p14="http://schemas.microsoft.com/office/powerpoint/2010/main" val="4182626820"/>
+      </p:ext>
+    </p:extLst>
+  </p:cSld>
+  <p:clrMapOvr>
+    <a:masterClrMapping/>
+  </p:clrMapOvr>
+</p:sld>
+</file>
+
+<file path=ppt/slides/slide13.xml><?xml version="1.0" encoding="utf-8"?>
+<p:sld xmlns:a="http://schemas.openxmlformats.org/drawingml/2006/main" xmlns:r="http://schemas.openxmlformats.org/officeDocument/2006/relationships" xmlns:p="http://schemas.openxmlformats.org/presentationml/2006/main">
+  <p:cSld>
+    <p:bg>
+      <p:bgPr>
+        <a:solidFill>
+          <a:schemeClr val="bg1"/>
+        </a:solidFill>
+        <a:effectLst/>
+      </p:bgPr>
+    </p:bg>
+    <p:spTree>
+      <p:nvGrpSpPr>
+        <p:cNvPr id="1" name=""/>
+        <p:cNvGrpSpPr/>
+        <p:nvPr/>
+      </p:nvGrpSpPr>
+      <p:grpSpPr>
+        <a:xfrm>
+          <a:off x="0" y="0"/>
+          <a:ext cx="0" cy="0"/>
+          <a:chOff x="0" y="0"/>
+          <a:chExt cx="0" cy="0"/>
+        </a:xfrm>
+      </p:grpSpPr>
+      <p:sp>
+        <p:nvSpPr>
+          <p:cNvPr id="21" name="Rectangle 20">
+            <a:extLst>
+              <a:ext uri="{FF2B5EF4-FFF2-40B4-BE49-F238E27FC236}">
+                <a16:creationId xmlns:a16="http://schemas.microsoft.com/office/drawing/2014/main" id="{823AC064-BC96-4F32-8AE1-B2FD38754823}"/>
+              </a:ext>
+              <a:ext uri="{C183D7F6-B498-43B3-948B-1728B52AA6E4}">
+                <adec:decorative xmlns:adec="http://schemas.microsoft.com/office/drawing/2017/decorative" val="1"/>
+              </a:ext>
+            </a:extLst>
+          </p:cNvPr>
+          <p:cNvSpPr>
+            <a:spLocks noGrp="1" noRot="1" noChangeAspect="1" noMove="1" noResize="1" noEditPoints="1" noAdjustHandles="1" noChangeArrowheads="1" noChangeShapeType="1" noTextEdit="1"/>
+          </p:cNvSpPr>
+          <p:nvPr>
+            <p:extLst>
+              <p:ext uri="{386F3935-93C4-4BCD-93E2-E3B085C9AB24}">
+                <p16:designElem xmlns:p16="http://schemas.microsoft.com/office/powerpoint/2015/main" val="1"/>
+              </p:ext>
+            </p:extLst>
+          </p:nvPr>
+        </p:nvSpPr>
+        <p:spPr bwMode="ltGray">
+          <a:xfrm>
+            <a:off x="378068" y="343486"/>
+            <a:ext cx="11438793" cy="1844256"/>
+          </a:xfrm>
+          <a:prstGeom prst="rect">
+            <a:avLst/>
+          </a:prstGeom>
+          <a:solidFill>
+            <a:srgbClr val="404040"/>
+          </a:solidFill>
+          <a:ln w="127000" cap="sq" cmpd="thinThick">
+            <a:solidFill>
+              <a:srgbClr val="404040"/>
+            </a:solidFill>
+          </a:ln>
+        </p:spPr>
+        <p:style>
+          <a:lnRef idx="2">
+            <a:schemeClr val="accent1">
+              <a:shade val="50000"/>
+            </a:schemeClr>
+          </a:lnRef>
+          <a:fillRef idx="1">
+            <a:schemeClr val="accent1"/>
+          </a:fillRef>
+          <a:effectRef idx="0">
+            <a:schemeClr val="accent1"/>
+          </a:effectRef>
+          <a:fontRef idx="minor">
+            <a:schemeClr val="lt1"/>
+          </a:fontRef>
+        </p:style>
+        <p:txBody>
+          <a:bodyPr rtlCol="0" anchor="ctr"/>
+          <a:lstStyle/>
+          <a:p>
+            <a:pPr marL="0" marR="0" lvl="0" indent="0" algn="ctr" defTabSz="914400" rtl="0" eaLnBrk="1" fontAlgn="auto" latinLnBrk="0" hangingPunct="1">
+              <a:lnSpc>
+                <a:spcPct val="100000"/>
+              </a:lnSpc>
+              <a:spcBef>
+                <a:spcPts val="0"/>
+              </a:spcBef>
+              <a:spcAft>
+                <a:spcPts val="0"/>
+              </a:spcAft>
+              <a:buClrTx/>
+              <a:buSzTx/>
+              <a:buFontTx/>
+              <a:buNone/>
+              <a:tabLst/>
+              <a:defRPr/>
+            </a:pPr>
+            <a:endParaRPr kumimoji="0" lang="en-US" sz="1800" b="0" i="0" u="none" strike="noStrike" kern="1200" cap="none" spc="0" normalizeH="0" baseline="0" noProof="0">
+              <a:ln>
+                <a:noFill/>
+              </a:ln>
+              <a:solidFill>
+                <a:prstClr val="white"/>
+              </a:solidFill>
+              <a:effectLst/>
+              <a:uLnTx/>
+              <a:uFillTx/>
+              <a:latin typeface="Calibri" panose="020F0502020204030204"/>
+              <a:ea typeface="+mn-ea"/>
+              <a:cs typeface="+mn-cs"/>
+            </a:endParaRPr>
+          </a:p>
+        </p:txBody>
+      </p:sp>
+      <p:sp>
+        <p:nvSpPr>
+          <p:cNvPr id="3" name="Title 2">
+            <a:extLst>
+              <a:ext uri="{FF2B5EF4-FFF2-40B4-BE49-F238E27FC236}">
+                <a16:creationId xmlns:a16="http://schemas.microsoft.com/office/drawing/2014/main" id="{7472A1B1-DDE7-4029-BF17-FEBDBD755E58}"/>
+              </a:ext>
+            </a:extLst>
+          </p:cNvPr>
+          <p:cNvSpPr>
+            <a:spLocks noGrp="1"/>
+          </p:cNvSpPr>
+          <p:nvPr>
+            <p:ph type="title"/>
+          </p:nvPr>
+        </p:nvSpPr>
+        <p:spPr>
+          <a:xfrm>
+            <a:off x="375139" y="466579"/>
+            <a:ext cx="11290788" cy="1447276"/>
+          </a:xfrm>
+        </p:spPr>
+        <p:txBody>
+          <a:bodyPr vert="horz" lIns="91440" tIns="45720" rIns="91440" bIns="45720" rtlCol="0" anchor="b">
+            <a:normAutofit fontScale="90000"/>
+          </a:bodyPr>
+          <a:lstStyle/>
+          <a:p>
+            <a:pPr algn="ctr"/>
+            <a:br>
+              <a:rPr lang="en-US" sz="3500" dirty="0">
+                <a:solidFill>
+                  <a:srgbClr val="FFFFFF"/>
+                </a:solidFill>
+              </a:rPr>
+            </a:br>
+            <a:r>
+              <a:rPr lang="en-US" sz="3500" dirty="0">
+                <a:solidFill>
+                  <a:srgbClr val="FFFFFF"/>
+                </a:solidFill>
+              </a:rPr>
+              <a:t>Factors that may affect investor sentiment on Bitcoin</a:t>
+            </a:r>
+            <a:br>
+              <a:rPr lang="en-US" sz="3500" dirty="0">
+                <a:solidFill>
+                  <a:srgbClr val="FFFFFF"/>
+                </a:solidFill>
+              </a:rPr>
+            </a:br>
+            <a:br>
+              <a:rPr lang="en-US" sz="3500" dirty="0">
+                <a:solidFill>
+                  <a:srgbClr val="FFFFFF"/>
+                </a:solidFill>
+              </a:rPr>
+            </a:br>
+            <a:endParaRPr lang="en-US" sz="3500" kern="1200" dirty="0">
+              <a:solidFill>
+                <a:srgbClr val="FFFFFF"/>
+              </a:solidFill>
+              <a:latin typeface="+mj-lt"/>
+              <a:ea typeface="+mj-ea"/>
+              <a:cs typeface="+mj-cs"/>
+            </a:endParaRPr>
+          </a:p>
+        </p:txBody>
+      </p:sp>
+      <p:cxnSp>
+        <p:nvCxnSpPr>
+          <p:cNvPr id="23" name="Straight Connector 22">
+            <a:extLst>
+              <a:ext uri="{FF2B5EF4-FFF2-40B4-BE49-F238E27FC236}">
+                <a16:creationId xmlns:a16="http://schemas.microsoft.com/office/drawing/2014/main" id="{7E7C77BC-7138-40B1-A15B-20F57A494629}"/>
+              </a:ext>
+              <a:ext uri="{C183D7F6-B498-43B3-948B-1728B52AA6E4}">
+                <adec:decorative xmlns:adec="http://schemas.microsoft.com/office/drawing/2017/decorative" val="1"/>
+              </a:ext>
+            </a:extLst>
+          </p:cNvPr>
+          <p:cNvCxnSpPr>
+            <a:cxnSpLocks noGrp="1" noRot="1" noChangeAspect="1" noMove="1" noResize="1" noEditPoints="1" noAdjustHandles="1" noChangeArrowheads="1" noChangeShapeType="1"/>
+          </p:cNvCxnSpPr>
+          <p:nvPr>
+            <p:extLst>
+              <p:ext uri="{386F3935-93C4-4BCD-93E2-E3B085C9AB24}">
+                <p16:designElem xmlns:p16="http://schemas.microsoft.com/office/powerpoint/2015/main" val="1"/>
+              </p:ext>
+            </p:extLst>
+          </p:nvPr>
+        </p:nvCxnSpPr>
+        <p:spPr>
+          <a:xfrm>
+            <a:off x="2209800" y="1448631"/>
+            <a:ext cx="7772400" cy="0"/>
+          </a:xfrm>
+          <a:prstGeom prst="line">
+            <a:avLst/>
+          </a:prstGeom>
+          <a:ln w="22225">
+            <a:solidFill>
+              <a:srgbClr val="D9D9D9"/>
+            </a:solidFill>
+          </a:ln>
+        </p:spPr>
+        <p:style>
+          <a:lnRef idx="1">
+            <a:schemeClr val="accent1"/>
+          </a:lnRef>
+          <a:fillRef idx="0">
+            <a:schemeClr val="accent1"/>
+          </a:fillRef>
+          <a:effectRef idx="0">
+            <a:schemeClr val="accent1"/>
+          </a:effectRef>
+          <a:fontRef idx="minor">
+            <a:schemeClr val="tx1"/>
+          </a:fontRef>
+        </p:style>
+      </p:cxnSp>
+      <p:pic>
+        <p:nvPicPr>
+          <p:cNvPr id="11" name="Picture 2" descr="Image result for bitcoin image">
+            <a:extLst>
+              <a:ext uri="{FF2B5EF4-FFF2-40B4-BE49-F238E27FC236}">
+                <a16:creationId xmlns:a16="http://schemas.microsoft.com/office/drawing/2014/main" id="{28C2E534-3A8A-4160-808C-C5EA5EE7195A}"/>
+              </a:ext>
+            </a:extLst>
+          </p:cNvPr>
+          <p:cNvPicPr>
+            <a:picLocks noChangeAspect="1" noChangeArrowheads="1"/>
+          </p:cNvPicPr>
+          <p:nvPr/>
+        </p:nvPicPr>
+        <p:blipFill rotWithShape="1">
+          <a:blip r:embed="rId2">
+            <a:extLst>
+              <a:ext uri="{28A0092B-C50C-407E-A947-70E740481C1C}">
+                <a14:useLocalDpi xmlns:a14="http://schemas.microsoft.com/office/drawing/2010/main" val="0"/>
+              </a:ext>
+            </a:extLst>
+          </a:blip>
+          <a:srcRect l="20360" r="5403" b="-3"/>
+          <a:stretch/>
+        </p:blipFill>
+        <p:spPr bwMode="auto">
+          <a:xfrm>
+            <a:off x="10628232" y="5484694"/>
+            <a:ext cx="1433628" cy="1289082"/>
+          </a:xfrm>
+          <a:prstGeom prst="rect">
+            <a:avLst/>
+          </a:prstGeom>
+          <a:extLst>
+            <a:ext uri="{909E8E84-426E-40DD-AFC4-6F175D3DCCD1}">
+              <a14:hiddenFill xmlns:a14="http://schemas.microsoft.com/office/drawing/2010/main">
+                <a:solidFill>
+                  <a:srgbClr val="FFFFFF"/>
+                </a:solidFill>
+              </a14:hiddenFill>
+            </a:ext>
+          </a:extLst>
+        </p:spPr>
+      </p:pic>
+      <p:pic>
+        <p:nvPicPr>
+          <p:cNvPr id="7" name="Content Placeholder 6">
+            <a:extLst>
+              <a:ext uri="{FF2B5EF4-FFF2-40B4-BE49-F238E27FC236}">
+                <a16:creationId xmlns:a16="http://schemas.microsoft.com/office/drawing/2014/main" id="{A49F0101-3429-45EE-8428-673D8B7E1F65}"/>
+              </a:ext>
+            </a:extLst>
+          </p:cNvPr>
+          <p:cNvPicPr>
+            <a:picLocks noGrp="1" noChangeAspect="1"/>
+          </p:cNvPicPr>
+          <p:nvPr>
+            <p:ph idx="1"/>
+          </p:nvPr>
+        </p:nvPicPr>
+        <p:blipFill>
+          <a:blip r:embed="rId3">
+            <a:extLst>
+              <a:ext uri="{28A0092B-C50C-407E-A947-70E740481C1C}">
+                <a14:useLocalDpi xmlns:a14="http://schemas.microsoft.com/office/drawing/2010/main" val="0"/>
+              </a:ext>
+            </a:extLst>
+          </a:blip>
+          <a:srcRect/>
+          <a:stretch/>
+        </p:blipFill>
+        <p:spPr>
+          <a:xfrm>
+            <a:off x="585011" y="2319831"/>
+            <a:ext cx="9372081" cy="4087493"/>
+          </a:xfrm>
+        </p:spPr>
+      </p:pic>
+      <p:sp>
+        <p:nvSpPr>
+          <p:cNvPr id="8" name="Rectangle 7">
+            <a:extLst>
+              <a:ext uri="{FF2B5EF4-FFF2-40B4-BE49-F238E27FC236}">
+                <a16:creationId xmlns:a16="http://schemas.microsoft.com/office/drawing/2014/main" id="{8D12C32D-A090-45AD-A73D-B2E8879B8BB3}"/>
+              </a:ext>
+            </a:extLst>
+          </p:cNvPr>
+          <p:cNvSpPr/>
+          <p:nvPr/>
+        </p:nvSpPr>
+        <p:spPr>
+          <a:xfrm>
+            <a:off x="8046452" y="3244334"/>
+            <a:ext cx="4015408" cy="646331"/>
+          </a:xfrm>
+          <a:prstGeom prst="rect">
+            <a:avLst/>
+          </a:prstGeom>
+        </p:spPr>
+        <p:txBody>
+          <a:bodyPr wrap="square">
+            <a:spAutoFit/>
+          </a:bodyPr>
+          <a:lstStyle/>
+          <a:p>
+            <a:pPr algn="just"/>
+            <a:r>
+              <a:rPr lang="en-US" dirty="0"/>
+              <a:t>Bitcoin addresses that holds at least 10,000 coins.</a:t>
+            </a:r>
+            <a:endParaRPr lang="en-US" sz="3000" dirty="0"/>
+          </a:p>
+        </p:txBody>
+      </p:sp>
+    </p:spTree>
+    <p:extLst>
+      <p:ext uri="{BB962C8B-B14F-4D97-AF65-F5344CB8AC3E}">
+        <p14:creationId xmlns:p14="http://schemas.microsoft.com/office/powerpoint/2010/main" val="3999710041"/>
+      </p:ext>
+    </p:extLst>
+  </p:cSld>
+  <p:clrMapOvr>
+    <a:masterClrMapping/>
+  </p:clrMapOvr>
+</p:sld>
+</file>
+
+<file path=ppt/slides/slide14.xml><?xml version="1.0" encoding="utf-8"?>
+<p:sld xmlns:a="http://schemas.openxmlformats.org/drawingml/2006/main" xmlns:r="http://schemas.openxmlformats.org/officeDocument/2006/relationships" xmlns:p="http://schemas.openxmlformats.org/presentationml/2006/main">
+  <p:cSld>
+    <p:bg>
+      <p:bgPr>
+        <a:solidFill>
+          <a:schemeClr val="bg1"/>
+        </a:solidFill>
+        <a:effectLst/>
+      </p:bgPr>
+    </p:bg>
+    <p:spTree>
+      <p:nvGrpSpPr>
+        <p:cNvPr id="1" name=""/>
+        <p:cNvGrpSpPr/>
+        <p:nvPr/>
+      </p:nvGrpSpPr>
+      <p:grpSpPr>
+        <a:xfrm>
+          <a:off x="0" y="0"/>
+          <a:ext cx="0" cy="0"/>
+          <a:chOff x="0" y="0"/>
+          <a:chExt cx="0" cy="0"/>
+        </a:xfrm>
+      </p:grpSpPr>
+      <p:sp>
+        <p:nvSpPr>
+          <p:cNvPr id="21" name="Rectangle 20">
+            <a:extLst>
+              <a:ext uri="{FF2B5EF4-FFF2-40B4-BE49-F238E27FC236}">
+                <a16:creationId xmlns:a16="http://schemas.microsoft.com/office/drawing/2014/main" id="{823AC064-BC96-4F32-8AE1-B2FD38754823}"/>
+              </a:ext>
+              <a:ext uri="{C183D7F6-B498-43B3-948B-1728B52AA6E4}">
+                <adec:decorative xmlns:adec="http://schemas.microsoft.com/office/drawing/2017/decorative" val="1"/>
+              </a:ext>
+            </a:extLst>
+          </p:cNvPr>
+          <p:cNvSpPr>
+            <a:spLocks noGrp="1" noRot="1" noChangeAspect="1" noMove="1" noResize="1" noEditPoints="1" noAdjustHandles="1" noChangeArrowheads="1" noChangeShapeType="1" noTextEdit="1"/>
+          </p:cNvSpPr>
+          <p:nvPr>
+            <p:extLst>
+              <p:ext uri="{386F3935-93C4-4BCD-93E2-E3B085C9AB24}">
+                <p16:designElem xmlns:p16="http://schemas.microsoft.com/office/powerpoint/2015/main" val="1"/>
+              </p:ext>
+            </p:extLst>
+          </p:nvPr>
+        </p:nvSpPr>
+        <p:spPr bwMode="ltGray">
+          <a:xfrm>
+            <a:off x="378068" y="343486"/>
+            <a:ext cx="11438793" cy="1844256"/>
+          </a:xfrm>
+          <a:prstGeom prst="rect">
+            <a:avLst/>
+          </a:prstGeom>
+          <a:solidFill>
+            <a:srgbClr val="404040"/>
+          </a:solidFill>
+          <a:ln w="127000" cap="sq" cmpd="thinThick">
+            <a:solidFill>
+              <a:srgbClr val="404040"/>
+            </a:solidFill>
+          </a:ln>
+        </p:spPr>
+        <p:style>
+          <a:lnRef idx="2">
+            <a:schemeClr val="accent1">
+              <a:shade val="50000"/>
+            </a:schemeClr>
+          </a:lnRef>
+          <a:fillRef idx="1">
+            <a:schemeClr val="accent1"/>
+          </a:fillRef>
+          <a:effectRef idx="0">
+            <a:schemeClr val="accent1"/>
+          </a:effectRef>
+          <a:fontRef idx="minor">
+            <a:schemeClr val="lt1"/>
+          </a:fontRef>
+        </p:style>
+        <p:txBody>
+          <a:bodyPr rtlCol="0" anchor="ctr"/>
+          <a:lstStyle/>
+          <a:p>
+            <a:pPr marL="0" marR="0" lvl="0" indent="0" algn="ctr" defTabSz="914400" rtl="0" eaLnBrk="1" fontAlgn="auto" latinLnBrk="0" hangingPunct="1">
+              <a:lnSpc>
+                <a:spcPct val="100000"/>
+              </a:lnSpc>
+              <a:spcBef>
+                <a:spcPts val="0"/>
+              </a:spcBef>
+              <a:spcAft>
+                <a:spcPts val="0"/>
+              </a:spcAft>
+              <a:buClrTx/>
+              <a:buSzTx/>
+              <a:buFontTx/>
+              <a:buNone/>
+              <a:tabLst/>
+              <a:defRPr/>
+            </a:pPr>
+            <a:endParaRPr kumimoji="0" lang="en-US" sz="1800" b="0" i="0" u="none" strike="noStrike" kern="1200" cap="none" spc="0" normalizeH="0" baseline="0" noProof="0">
+              <a:ln>
+                <a:noFill/>
+              </a:ln>
+              <a:solidFill>
+                <a:prstClr val="white"/>
+              </a:solidFill>
+              <a:effectLst/>
+              <a:uLnTx/>
+              <a:uFillTx/>
+              <a:latin typeface="Calibri" panose="020F0502020204030204"/>
+              <a:ea typeface="+mn-ea"/>
+              <a:cs typeface="+mn-cs"/>
+            </a:endParaRPr>
+          </a:p>
+        </p:txBody>
+      </p:sp>
+      <p:sp>
+        <p:nvSpPr>
+          <p:cNvPr id="3" name="Title 2">
+            <a:extLst>
+              <a:ext uri="{FF2B5EF4-FFF2-40B4-BE49-F238E27FC236}">
+                <a16:creationId xmlns:a16="http://schemas.microsoft.com/office/drawing/2014/main" id="{7472A1B1-DDE7-4029-BF17-FEBDBD755E58}"/>
+              </a:ext>
+            </a:extLst>
+          </p:cNvPr>
+          <p:cNvSpPr>
+            <a:spLocks noGrp="1"/>
+          </p:cNvSpPr>
+          <p:nvPr>
+            <p:ph type="title"/>
+          </p:nvPr>
+        </p:nvSpPr>
+        <p:spPr>
+          <a:xfrm>
+            <a:off x="375139" y="466579"/>
+            <a:ext cx="11290788" cy="1447276"/>
+          </a:xfrm>
+        </p:spPr>
+        <p:txBody>
+          <a:bodyPr vert="horz" lIns="91440" tIns="45720" rIns="91440" bIns="45720" rtlCol="0" anchor="b">
+            <a:normAutofit fontScale="90000"/>
+          </a:bodyPr>
+          <a:lstStyle/>
+          <a:p>
+            <a:pPr algn="ctr"/>
+            <a:br>
+              <a:rPr lang="en-US" sz="3500" dirty="0">
+                <a:solidFill>
+                  <a:srgbClr val="FFFFFF"/>
+                </a:solidFill>
+              </a:rPr>
+            </a:br>
+            <a:r>
+              <a:rPr lang="en-US" sz="3500" dirty="0">
+                <a:solidFill>
+                  <a:srgbClr val="FFFFFF"/>
+                </a:solidFill>
+              </a:rPr>
+              <a:t>Factors that may affect investor sentiment on Bitcoin</a:t>
+            </a:r>
+            <a:br>
+              <a:rPr lang="en-US" sz="3500" dirty="0">
+                <a:solidFill>
+                  <a:srgbClr val="FFFFFF"/>
+                </a:solidFill>
+              </a:rPr>
+            </a:br>
+            <a:br>
+              <a:rPr lang="en-US" sz="3500" dirty="0">
+                <a:solidFill>
+                  <a:srgbClr val="FFFFFF"/>
+                </a:solidFill>
+              </a:rPr>
+            </a:br>
+            <a:endParaRPr lang="en-US" sz="3500" kern="1200" dirty="0">
+              <a:solidFill>
+                <a:srgbClr val="FFFFFF"/>
+              </a:solidFill>
+              <a:latin typeface="+mj-lt"/>
+              <a:ea typeface="+mj-ea"/>
+              <a:cs typeface="+mj-cs"/>
+            </a:endParaRPr>
+          </a:p>
+        </p:txBody>
+      </p:sp>
+      <p:cxnSp>
+        <p:nvCxnSpPr>
+          <p:cNvPr id="23" name="Straight Connector 22">
+            <a:extLst>
+              <a:ext uri="{FF2B5EF4-FFF2-40B4-BE49-F238E27FC236}">
+                <a16:creationId xmlns:a16="http://schemas.microsoft.com/office/drawing/2014/main" id="{7E7C77BC-7138-40B1-A15B-20F57A494629}"/>
+              </a:ext>
+              <a:ext uri="{C183D7F6-B498-43B3-948B-1728B52AA6E4}">
+                <adec:decorative xmlns:adec="http://schemas.microsoft.com/office/drawing/2017/decorative" val="1"/>
+              </a:ext>
+            </a:extLst>
+          </p:cNvPr>
+          <p:cNvCxnSpPr>
+            <a:cxnSpLocks noGrp="1" noRot="1" noChangeAspect="1" noMove="1" noResize="1" noEditPoints="1" noAdjustHandles="1" noChangeArrowheads="1" noChangeShapeType="1"/>
+          </p:cNvCxnSpPr>
+          <p:nvPr>
+            <p:extLst>
+              <p:ext uri="{386F3935-93C4-4BCD-93E2-E3B085C9AB24}">
+                <p16:designElem xmlns:p16="http://schemas.microsoft.com/office/powerpoint/2015/main" val="1"/>
+              </p:ext>
+            </p:extLst>
+          </p:nvPr>
+        </p:nvCxnSpPr>
+        <p:spPr>
+          <a:xfrm>
+            <a:off x="2209800" y="1448631"/>
+            <a:ext cx="7772400" cy="0"/>
+          </a:xfrm>
+          <a:prstGeom prst="line">
+            <a:avLst/>
+          </a:prstGeom>
+          <a:ln w="22225">
+            <a:solidFill>
+              <a:srgbClr val="D9D9D9"/>
+            </a:solidFill>
+          </a:ln>
+        </p:spPr>
+        <p:style>
+          <a:lnRef idx="1">
+            <a:schemeClr val="accent1"/>
+          </a:lnRef>
+          <a:fillRef idx="0">
+            <a:schemeClr val="accent1"/>
+          </a:fillRef>
+          <a:effectRef idx="0">
+            <a:schemeClr val="accent1"/>
+          </a:effectRef>
+          <a:fontRef idx="minor">
+            <a:schemeClr val="tx1"/>
+          </a:fontRef>
+        </p:style>
+      </p:cxnSp>
+      <p:pic>
+        <p:nvPicPr>
+          <p:cNvPr id="11" name="Picture 2" descr="Image result for bitcoin image">
+            <a:extLst>
+              <a:ext uri="{FF2B5EF4-FFF2-40B4-BE49-F238E27FC236}">
+                <a16:creationId xmlns:a16="http://schemas.microsoft.com/office/drawing/2014/main" id="{28C2E534-3A8A-4160-808C-C5EA5EE7195A}"/>
+              </a:ext>
+            </a:extLst>
+          </p:cNvPr>
+          <p:cNvPicPr>
+            <a:picLocks noChangeAspect="1" noChangeArrowheads="1"/>
+          </p:cNvPicPr>
+          <p:nvPr/>
+        </p:nvPicPr>
+        <p:blipFill rotWithShape="1">
+          <a:blip r:embed="rId2">
+            <a:extLst>
+              <a:ext uri="{28A0092B-C50C-407E-A947-70E740481C1C}">
+                <a14:useLocalDpi xmlns:a14="http://schemas.microsoft.com/office/drawing/2010/main" val="0"/>
+              </a:ext>
+            </a:extLst>
+          </a:blip>
+          <a:srcRect l="20360" r="5403" b="-3"/>
+          <a:stretch/>
+        </p:blipFill>
+        <p:spPr bwMode="auto">
+          <a:xfrm>
+            <a:off x="10628232" y="5484694"/>
+            <a:ext cx="1433628" cy="1289082"/>
+          </a:xfrm>
+          <a:prstGeom prst="rect">
+            <a:avLst/>
+          </a:prstGeom>
+          <a:extLst>
+            <a:ext uri="{909E8E84-426E-40DD-AFC4-6F175D3DCCD1}">
+              <a14:hiddenFill xmlns:a14="http://schemas.microsoft.com/office/drawing/2010/main">
+                <a:solidFill>
+                  <a:srgbClr val="FFFFFF"/>
+                </a:solidFill>
+              </a14:hiddenFill>
+            </a:ext>
+          </a:extLst>
+        </p:spPr>
+      </p:pic>
+      <p:pic>
+        <p:nvPicPr>
+          <p:cNvPr id="7" name="Content Placeholder 6">
+            <a:extLst>
+              <a:ext uri="{FF2B5EF4-FFF2-40B4-BE49-F238E27FC236}">
+                <a16:creationId xmlns:a16="http://schemas.microsoft.com/office/drawing/2014/main" id="{A49F0101-3429-45EE-8428-673D8B7E1F65}"/>
+              </a:ext>
+            </a:extLst>
+          </p:cNvPr>
+          <p:cNvPicPr>
+            <a:picLocks noGrp="1" noChangeAspect="1"/>
+          </p:cNvPicPr>
+          <p:nvPr>
+            <p:ph idx="1"/>
+          </p:nvPr>
+        </p:nvPicPr>
+        <p:blipFill>
+          <a:blip r:embed="rId3">
+            <a:extLst>
+              <a:ext uri="{28A0092B-C50C-407E-A947-70E740481C1C}">
+                <a14:useLocalDpi xmlns:a14="http://schemas.microsoft.com/office/drawing/2010/main" val="0"/>
+              </a:ext>
+            </a:extLst>
+          </a:blip>
+          <a:srcRect/>
+          <a:stretch/>
+        </p:blipFill>
+        <p:spPr>
+          <a:xfrm>
+            <a:off x="711925" y="2319831"/>
+            <a:ext cx="8133901" cy="4087493"/>
+          </a:xfrm>
+        </p:spPr>
+      </p:pic>
+      <p:sp>
+        <p:nvSpPr>
+          <p:cNvPr id="8" name="Rectangle 7">
+            <a:extLst>
+              <a:ext uri="{FF2B5EF4-FFF2-40B4-BE49-F238E27FC236}">
+                <a16:creationId xmlns:a16="http://schemas.microsoft.com/office/drawing/2014/main" id="{8D12C32D-A090-45AD-A73D-B2E8879B8BB3}"/>
+              </a:ext>
+            </a:extLst>
+          </p:cNvPr>
+          <p:cNvSpPr/>
+          <p:nvPr/>
+        </p:nvSpPr>
+        <p:spPr>
+          <a:xfrm>
+            <a:off x="8656982" y="3244334"/>
+            <a:ext cx="3404877" cy="923330"/>
+          </a:xfrm>
+          <a:prstGeom prst="rect">
+            <a:avLst/>
+          </a:prstGeom>
+        </p:spPr>
+        <p:txBody>
+          <a:bodyPr wrap="square">
+            <a:spAutoFit/>
+          </a:bodyPr>
+          <a:lstStyle/>
+          <a:p>
+            <a:pPr algn="just"/>
+            <a:r>
+              <a:rPr lang="en-US" dirty="0"/>
+              <a:t>The SOPR shows bitcoin’s price sold / price paid and it seems flat compared to 2010-2011</a:t>
+            </a:r>
+            <a:endParaRPr lang="en-US" sz="3000" dirty="0"/>
+          </a:p>
+        </p:txBody>
+      </p:sp>
+    </p:spTree>
+    <p:extLst>
+      <p:ext uri="{BB962C8B-B14F-4D97-AF65-F5344CB8AC3E}">
+        <p14:creationId xmlns:p14="http://schemas.microsoft.com/office/powerpoint/2010/main" val="3762308055"/>
+      </p:ext>
+    </p:extLst>
+  </p:cSld>
+  <p:clrMapOvr>
+    <a:masterClrMapping/>
+  </p:clrMapOvr>
+</p:sld>
+</file>
+
+<file path=ppt/slides/slide15.xml><?xml version="1.0" encoding="utf-8"?>
+<p:sld xmlns:a="http://schemas.openxmlformats.org/drawingml/2006/main" xmlns:r="http://schemas.openxmlformats.org/officeDocument/2006/relationships" xmlns:p="http://schemas.openxmlformats.org/presentationml/2006/main">
+  <p:cSld>
+    <p:bg>
+      <p:bgPr>
+        <a:solidFill>
+          <a:schemeClr val="bg1"/>
+        </a:solidFill>
+        <a:effectLst/>
+      </p:bgPr>
+    </p:bg>
+    <p:spTree>
+      <p:nvGrpSpPr>
+        <p:cNvPr id="1" name=""/>
+        <p:cNvGrpSpPr/>
+        <p:nvPr/>
+      </p:nvGrpSpPr>
+      <p:grpSpPr>
+        <a:xfrm>
+          <a:off x="0" y="0"/>
+          <a:ext cx="0" cy="0"/>
+          <a:chOff x="0" y="0"/>
+          <a:chExt cx="0" cy="0"/>
+        </a:xfrm>
+      </p:grpSpPr>
+      <p:sp>
+        <p:nvSpPr>
+          <p:cNvPr id="21" name="Rectangle 20">
+            <a:extLst>
+              <a:ext uri="{FF2B5EF4-FFF2-40B4-BE49-F238E27FC236}">
+                <a16:creationId xmlns:a16="http://schemas.microsoft.com/office/drawing/2014/main" id="{823AC064-BC96-4F32-8AE1-B2FD38754823}"/>
+              </a:ext>
+              <a:ext uri="{C183D7F6-B498-43B3-948B-1728B52AA6E4}">
+                <adec:decorative xmlns:adec="http://schemas.microsoft.com/office/drawing/2017/decorative" val="1"/>
+              </a:ext>
+            </a:extLst>
+          </p:cNvPr>
+          <p:cNvSpPr>
+            <a:spLocks noGrp="1" noRot="1" noChangeAspect="1" noMove="1" noResize="1" noEditPoints="1" noAdjustHandles="1" noChangeArrowheads="1" noChangeShapeType="1" noTextEdit="1"/>
+          </p:cNvSpPr>
+          <p:nvPr>
+            <p:extLst>
+              <p:ext uri="{386F3935-93C4-4BCD-93E2-E3B085C9AB24}">
+                <p16:designElem xmlns:p16="http://schemas.microsoft.com/office/powerpoint/2015/main" val="1"/>
+              </p:ext>
+            </p:extLst>
+          </p:nvPr>
+        </p:nvSpPr>
+        <p:spPr bwMode="ltGray">
+          <a:xfrm>
+            <a:off x="378068" y="343486"/>
+            <a:ext cx="11438793" cy="1844256"/>
+          </a:xfrm>
+          <a:prstGeom prst="rect">
+            <a:avLst/>
+          </a:prstGeom>
+          <a:solidFill>
+            <a:srgbClr val="404040"/>
+          </a:solidFill>
+          <a:ln w="127000" cap="sq" cmpd="thinThick">
+            <a:solidFill>
+              <a:srgbClr val="404040"/>
+            </a:solidFill>
+          </a:ln>
+        </p:spPr>
+        <p:style>
+          <a:lnRef idx="2">
+            <a:schemeClr val="accent1">
+              <a:shade val="50000"/>
+            </a:schemeClr>
+          </a:lnRef>
+          <a:fillRef idx="1">
+            <a:schemeClr val="accent1"/>
+          </a:fillRef>
+          <a:effectRef idx="0">
+            <a:schemeClr val="accent1"/>
+          </a:effectRef>
+          <a:fontRef idx="minor">
+            <a:schemeClr val="lt1"/>
+          </a:fontRef>
+        </p:style>
+        <p:txBody>
+          <a:bodyPr rtlCol="0" anchor="ctr"/>
+          <a:lstStyle/>
+          <a:p>
+            <a:pPr marL="0" marR="0" lvl="0" indent="0" algn="ctr" defTabSz="914400" rtl="0" eaLnBrk="1" fontAlgn="auto" latinLnBrk="0" hangingPunct="1">
+              <a:lnSpc>
+                <a:spcPct val="100000"/>
+              </a:lnSpc>
+              <a:spcBef>
+                <a:spcPts val="0"/>
+              </a:spcBef>
+              <a:spcAft>
+                <a:spcPts val="0"/>
+              </a:spcAft>
+              <a:buClrTx/>
+              <a:buSzTx/>
+              <a:buFontTx/>
+              <a:buNone/>
+              <a:tabLst/>
+              <a:defRPr/>
+            </a:pPr>
+            <a:endParaRPr kumimoji="0" lang="en-US" sz="1800" b="0" i="0" u="none" strike="noStrike" kern="1200" cap="none" spc="0" normalizeH="0" baseline="0" noProof="0">
+              <a:ln>
+                <a:noFill/>
+              </a:ln>
+              <a:solidFill>
+                <a:prstClr val="white"/>
+              </a:solidFill>
+              <a:effectLst/>
+              <a:uLnTx/>
+              <a:uFillTx/>
+              <a:latin typeface="Calibri" panose="020F0502020204030204"/>
+              <a:ea typeface="+mn-ea"/>
+              <a:cs typeface="+mn-cs"/>
+            </a:endParaRPr>
+          </a:p>
+        </p:txBody>
+      </p:sp>
+      <p:sp>
+        <p:nvSpPr>
+          <p:cNvPr id="3" name="Title 2">
+            <a:extLst>
+              <a:ext uri="{FF2B5EF4-FFF2-40B4-BE49-F238E27FC236}">
+                <a16:creationId xmlns:a16="http://schemas.microsoft.com/office/drawing/2014/main" id="{7472A1B1-DDE7-4029-BF17-FEBDBD755E58}"/>
+              </a:ext>
+            </a:extLst>
+          </p:cNvPr>
+          <p:cNvSpPr>
+            <a:spLocks noGrp="1"/>
+          </p:cNvSpPr>
+          <p:nvPr>
+            <p:ph type="title"/>
+          </p:nvPr>
+        </p:nvSpPr>
+        <p:spPr>
+          <a:xfrm>
+            <a:off x="375139" y="466579"/>
+            <a:ext cx="11290788" cy="1447276"/>
+          </a:xfrm>
+        </p:spPr>
+        <p:txBody>
+          <a:bodyPr vert="horz" lIns="91440" tIns="45720" rIns="91440" bIns="45720" rtlCol="0" anchor="b">
+            <a:normAutofit fontScale="90000"/>
+          </a:bodyPr>
+          <a:lstStyle/>
+          <a:p>
+            <a:pPr algn="ctr"/>
+            <a:br>
+              <a:rPr lang="en-US" sz="3500" dirty="0">
+                <a:solidFill>
+                  <a:srgbClr val="FFFFFF"/>
+                </a:solidFill>
+              </a:rPr>
+            </a:br>
+            <a:r>
+              <a:rPr lang="en-US" sz="3500" dirty="0">
+                <a:solidFill>
+                  <a:srgbClr val="FFFFFF"/>
+                </a:solidFill>
+              </a:rPr>
+              <a:t>Factors that may affect investor sentiment on Bitcoin</a:t>
+            </a:r>
+            <a:br>
+              <a:rPr lang="en-US" sz="3500" dirty="0">
+                <a:solidFill>
+                  <a:srgbClr val="FFFFFF"/>
+                </a:solidFill>
+              </a:rPr>
+            </a:br>
+            <a:br>
+              <a:rPr lang="en-US" sz="3500" dirty="0">
+                <a:solidFill>
+                  <a:srgbClr val="FFFFFF"/>
+                </a:solidFill>
+              </a:rPr>
+            </a:br>
+            <a:endParaRPr lang="en-US" sz="3500" kern="1200" dirty="0">
+              <a:solidFill>
+                <a:srgbClr val="FFFFFF"/>
+              </a:solidFill>
+              <a:latin typeface="+mj-lt"/>
+              <a:ea typeface="+mj-ea"/>
+              <a:cs typeface="+mj-cs"/>
+            </a:endParaRPr>
+          </a:p>
+        </p:txBody>
+      </p:sp>
+      <p:cxnSp>
+        <p:nvCxnSpPr>
+          <p:cNvPr id="23" name="Straight Connector 22">
+            <a:extLst>
+              <a:ext uri="{FF2B5EF4-FFF2-40B4-BE49-F238E27FC236}">
+                <a16:creationId xmlns:a16="http://schemas.microsoft.com/office/drawing/2014/main" id="{7E7C77BC-7138-40B1-A15B-20F57A494629}"/>
+              </a:ext>
+              <a:ext uri="{C183D7F6-B498-43B3-948B-1728B52AA6E4}">
+                <adec:decorative xmlns:adec="http://schemas.microsoft.com/office/drawing/2017/decorative" val="1"/>
+              </a:ext>
+            </a:extLst>
+          </p:cNvPr>
+          <p:cNvCxnSpPr>
+            <a:cxnSpLocks noGrp="1" noRot="1" noChangeAspect="1" noMove="1" noResize="1" noEditPoints="1" noAdjustHandles="1" noChangeArrowheads="1" noChangeShapeType="1"/>
+          </p:cNvCxnSpPr>
+          <p:nvPr>
+            <p:extLst>
+              <p:ext uri="{386F3935-93C4-4BCD-93E2-E3B085C9AB24}">
+                <p16:designElem xmlns:p16="http://schemas.microsoft.com/office/powerpoint/2015/main" val="1"/>
+              </p:ext>
+            </p:extLst>
+          </p:nvPr>
+        </p:nvCxnSpPr>
+        <p:spPr>
+          <a:xfrm>
+            <a:off x="2209800" y="1448631"/>
+            <a:ext cx="7772400" cy="0"/>
+          </a:xfrm>
+          <a:prstGeom prst="line">
+            <a:avLst/>
+          </a:prstGeom>
+          <a:ln w="22225">
+            <a:solidFill>
+              <a:srgbClr val="D9D9D9"/>
+            </a:solidFill>
+          </a:ln>
+        </p:spPr>
+        <p:style>
+          <a:lnRef idx="1">
+            <a:schemeClr val="accent1"/>
+          </a:lnRef>
+          <a:fillRef idx="0">
+            <a:schemeClr val="accent1"/>
+          </a:fillRef>
+          <a:effectRef idx="0">
+            <a:schemeClr val="accent1"/>
+          </a:effectRef>
+          <a:fontRef idx="minor">
+            <a:schemeClr val="tx1"/>
+          </a:fontRef>
+        </p:style>
+      </p:cxnSp>
+      <p:pic>
+        <p:nvPicPr>
+          <p:cNvPr id="11" name="Picture 2" descr="Image result for bitcoin image">
+            <a:extLst>
+              <a:ext uri="{FF2B5EF4-FFF2-40B4-BE49-F238E27FC236}">
+                <a16:creationId xmlns:a16="http://schemas.microsoft.com/office/drawing/2014/main" id="{28C2E534-3A8A-4160-808C-C5EA5EE7195A}"/>
+              </a:ext>
+            </a:extLst>
+          </p:cNvPr>
+          <p:cNvPicPr>
+            <a:picLocks noChangeAspect="1" noChangeArrowheads="1"/>
+          </p:cNvPicPr>
+          <p:nvPr/>
+        </p:nvPicPr>
+        <p:blipFill rotWithShape="1">
+          <a:blip r:embed="rId2">
+            <a:extLst>
+              <a:ext uri="{28A0092B-C50C-407E-A947-70E740481C1C}">
+                <a14:useLocalDpi xmlns:a14="http://schemas.microsoft.com/office/drawing/2010/main" val="0"/>
+              </a:ext>
+            </a:extLst>
+          </a:blip>
+          <a:srcRect l="20360" r="5403" b="-3"/>
+          <a:stretch/>
+        </p:blipFill>
+        <p:spPr bwMode="auto">
+          <a:xfrm>
+            <a:off x="10628232" y="5484694"/>
+            <a:ext cx="1433628" cy="1289082"/>
+          </a:xfrm>
+          <a:prstGeom prst="rect">
+            <a:avLst/>
+          </a:prstGeom>
+          <a:extLst>
+            <a:ext uri="{909E8E84-426E-40DD-AFC4-6F175D3DCCD1}">
+              <a14:hiddenFill xmlns:a14="http://schemas.microsoft.com/office/drawing/2010/main">
+                <a:solidFill>
+                  <a:srgbClr val="FFFFFF"/>
+                </a:solidFill>
+              </a14:hiddenFill>
+            </a:ext>
+          </a:extLst>
+        </p:spPr>
+      </p:pic>
+      <p:pic>
+        <p:nvPicPr>
+          <p:cNvPr id="7" name="Content Placeholder 6">
+            <a:extLst>
+              <a:ext uri="{FF2B5EF4-FFF2-40B4-BE49-F238E27FC236}">
+                <a16:creationId xmlns:a16="http://schemas.microsoft.com/office/drawing/2014/main" id="{A49F0101-3429-45EE-8428-673D8B7E1F65}"/>
+              </a:ext>
+            </a:extLst>
+          </p:cNvPr>
+          <p:cNvPicPr>
+            <a:picLocks noGrp="1" noChangeAspect="1"/>
+          </p:cNvPicPr>
+          <p:nvPr>
+            <p:ph idx="1"/>
+          </p:nvPr>
+        </p:nvPicPr>
+        <p:blipFill>
+          <a:blip r:embed="rId3">
+            <a:extLst>
+              <a:ext uri="{28A0092B-C50C-407E-A947-70E740481C1C}">
+                <a14:useLocalDpi xmlns:a14="http://schemas.microsoft.com/office/drawing/2010/main" val="0"/>
+              </a:ext>
+            </a:extLst>
+          </a:blip>
+          <a:srcRect/>
+          <a:stretch/>
+        </p:blipFill>
+        <p:spPr>
+          <a:xfrm>
+            <a:off x="711925" y="2576308"/>
+            <a:ext cx="8133901" cy="3574539"/>
+          </a:xfrm>
+        </p:spPr>
+      </p:pic>
+      <p:sp>
+        <p:nvSpPr>
+          <p:cNvPr id="8" name="Rectangle 7">
+            <a:extLst>
+              <a:ext uri="{FF2B5EF4-FFF2-40B4-BE49-F238E27FC236}">
+                <a16:creationId xmlns:a16="http://schemas.microsoft.com/office/drawing/2014/main" id="{8D12C32D-A090-45AD-A73D-B2E8879B8BB3}"/>
+              </a:ext>
+            </a:extLst>
+          </p:cNvPr>
+          <p:cNvSpPr/>
+          <p:nvPr/>
+        </p:nvSpPr>
+        <p:spPr>
+          <a:xfrm>
+            <a:off x="8656982" y="3244334"/>
+            <a:ext cx="3404877" cy="1200329"/>
+          </a:xfrm>
+          <a:prstGeom prst="rect">
+            <a:avLst/>
+          </a:prstGeom>
+        </p:spPr>
+        <p:txBody>
+          <a:bodyPr wrap="square">
+            <a:spAutoFit/>
+          </a:bodyPr>
+          <a:lstStyle/>
+          <a:p>
+            <a:pPr algn="just"/>
+            <a:r>
+              <a:rPr lang="en-US" dirty="0"/>
+              <a:t>The NVT Ratio is computed by dividing the market cap by the transferred on-chain volume measured in USD. </a:t>
+            </a:r>
+            <a:endParaRPr lang="en-US" sz="3000" dirty="0"/>
+          </a:p>
+        </p:txBody>
+      </p:sp>
+    </p:spTree>
+    <p:extLst>
+      <p:ext uri="{BB962C8B-B14F-4D97-AF65-F5344CB8AC3E}">
+        <p14:creationId xmlns:p14="http://schemas.microsoft.com/office/powerpoint/2010/main" val="2033565333"/>
+      </p:ext>
+    </p:extLst>
+  </p:cSld>
+  <p:clrMapOvr>
+    <a:masterClrMapping/>
+  </p:clrMapOvr>
+</p:sld>
+</file>
+
+<file path=ppt/slides/slide16.xml><?xml version="1.0" encoding="utf-8"?>
+<p:sld xmlns:a="http://schemas.openxmlformats.org/drawingml/2006/main" xmlns:r="http://schemas.openxmlformats.org/officeDocument/2006/relationships" xmlns:p="http://schemas.openxmlformats.org/presentationml/2006/main">
+  <p:cSld>
+    <p:bg>
+      <p:bgPr>
+        <a:solidFill>
+          <a:schemeClr val="bg1"/>
+        </a:solidFill>
+        <a:effectLst/>
+      </p:bgPr>
+    </p:bg>
+    <p:spTree>
+      <p:nvGrpSpPr>
+        <p:cNvPr id="1" name=""/>
+        <p:cNvGrpSpPr/>
+        <p:nvPr/>
+      </p:nvGrpSpPr>
+      <p:grpSpPr>
+        <a:xfrm>
+          <a:off x="0" y="0"/>
+          <a:ext cx="0" cy="0"/>
+          <a:chOff x="0" y="0"/>
+          <a:chExt cx="0" cy="0"/>
+        </a:xfrm>
+      </p:grpSpPr>
+      <p:sp>
+        <p:nvSpPr>
+          <p:cNvPr id="21" name="Rectangle 20">
+            <a:extLst>
+              <a:ext uri="{FF2B5EF4-FFF2-40B4-BE49-F238E27FC236}">
+                <a16:creationId xmlns:a16="http://schemas.microsoft.com/office/drawing/2014/main" id="{823AC064-BC96-4F32-8AE1-B2FD38754823}"/>
+              </a:ext>
+              <a:ext uri="{C183D7F6-B498-43B3-948B-1728B52AA6E4}">
+                <adec:decorative xmlns:adec="http://schemas.microsoft.com/office/drawing/2017/decorative" val="1"/>
+              </a:ext>
+            </a:extLst>
+          </p:cNvPr>
+          <p:cNvSpPr>
+            <a:spLocks noGrp="1" noRot="1" noChangeAspect="1" noMove="1" noResize="1" noEditPoints="1" noAdjustHandles="1" noChangeArrowheads="1" noChangeShapeType="1" noTextEdit="1"/>
+          </p:cNvSpPr>
+          <p:nvPr>
+            <p:extLst>
+              <p:ext uri="{386F3935-93C4-4BCD-93E2-E3B085C9AB24}">
+                <p16:designElem xmlns:p16="http://schemas.microsoft.com/office/powerpoint/2015/main" val="1"/>
+              </p:ext>
+            </p:extLst>
+          </p:nvPr>
+        </p:nvSpPr>
+        <p:spPr bwMode="ltGray">
+          <a:xfrm>
+            <a:off x="378068" y="343486"/>
+            <a:ext cx="11438793" cy="1844256"/>
+          </a:xfrm>
+          <a:prstGeom prst="rect">
+            <a:avLst/>
+          </a:prstGeom>
+          <a:solidFill>
+            <a:srgbClr val="404040"/>
+          </a:solidFill>
+          <a:ln w="127000" cap="sq" cmpd="thinThick">
+            <a:solidFill>
+              <a:srgbClr val="404040"/>
+            </a:solidFill>
+          </a:ln>
+        </p:spPr>
+        <p:style>
+          <a:lnRef idx="2">
+            <a:schemeClr val="accent1">
+              <a:shade val="50000"/>
+            </a:schemeClr>
+          </a:lnRef>
+          <a:fillRef idx="1">
+            <a:schemeClr val="accent1"/>
+          </a:fillRef>
+          <a:effectRef idx="0">
+            <a:schemeClr val="accent1"/>
+          </a:effectRef>
+          <a:fontRef idx="minor">
+            <a:schemeClr val="lt1"/>
+          </a:fontRef>
+        </p:style>
+        <p:txBody>
+          <a:bodyPr rtlCol="0" anchor="ctr"/>
+          <a:lstStyle/>
+          <a:p>
+            <a:pPr marL="0" marR="0" lvl="0" indent="0" algn="ctr" defTabSz="914400" rtl="0" eaLnBrk="1" fontAlgn="auto" latinLnBrk="0" hangingPunct="1">
+              <a:lnSpc>
+                <a:spcPct val="100000"/>
+              </a:lnSpc>
+              <a:spcBef>
+                <a:spcPts val="0"/>
+              </a:spcBef>
+              <a:spcAft>
+                <a:spcPts val="0"/>
+              </a:spcAft>
+              <a:buClrTx/>
+              <a:buSzTx/>
+              <a:buFontTx/>
+              <a:buNone/>
+              <a:tabLst/>
+              <a:defRPr/>
+            </a:pPr>
+            <a:endParaRPr kumimoji="0" lang="en-US" sz="1800" b="0" i="0" u="none" strike="noStrike" kern="1200" cap="none" spc="0" normalizeH="0" baseline="0" noProof="0">
+              <a:ln>
+                <a:noFill/>
+              </a:ln>
+              <a:solidFill>
+                <a:prstClr val="white"/>
+              </a:solidFill>
+              <a:effectLst/>
+              <a:uLnTx/>
+              <a:uFillTx/>
+              <a:latin typeface="Calibri" panose="020F0502020204030204"/>
+              <a:ea typeface="+mn-ea"/>
+              <a:cs typeface="+mn-cs"/>
+            </a:endParaRPr>
+          </a:p>
+        </p:txBody>
+      </p:sp>
+      <p:sp>
+        <p:nvSpPr>
+          <p:cNvPr id="3" name="Title 2">
+            <a:extLst>
+              <a:ext uri="{FF2B5EF4-FFF2-40B4-BE49-F238E27FC236}">
+                <a16:creationId xmlns:a16="http://schemas.microsoft.com/office/drawing/2014/main" id="{7472A1B1-DDE7-4029-BF17-FEBDBD755E58}"/>
+              </a:ext>
+            </a:extLst>
+          </p:cNvPr>
+          <p:cNvSpPr>
+            <a:spLocks noGrp="1"/>
+          </p:cNvSpPr>
+          <p:nvPr>
+            <p:ph type="title"/>
+          </p:nvPr>
+        </p:nvSpPr>
+        <p:spPr>
+          <a:xfrm>
+            <a:off x="375139" y="466579"/>
+            <a:ext cx="11290788" cy="1447276"/>
+          </a:xfrm>
+        </p:spPr>
+        <p:txBody>
+          <a:bodyPr vert="horz" lIns="91440" tIns="45720" rIns="91440" bIns="45720" rtlCol="0" anchor="b">
+            <a:normAutofit fontScale="90000"/>
+          </a:bodyPr>
+          <a:lstStyle/>
+          <a:p>
+            <a:pPr algn="ctr"/>
+            <a:br>
+              <a:rPr lang="en-US" sz="3500" dirty="0">
+                <a:solidFill>
+                  <a:srgbClr val="FFFFFF"/>
+                </a:solidFill>
+              </a:rPr>
+            </a:br>
+            <a:r>
+              <a:rPr lang="en-US" sz="3500" dirty="0">
+                <a:solidFill>
+                  <a:srgbClr val="FFFFFF"/>
+                </a:solidFill>
+              </a:rPr>
+              <a:t>Factors that may affect investor sentiment on Bitcoin</a:t>
+            </a:r>
+            <a:br>
+              <a:rPr lang="en-US" sz="3500" dirty="0">
+                <a:solidFill>
+                  <a:srgbClr val="FFFFFF"/>
+                </a:solidFill>
+              </a:rPr>
+            </a:br>
+            <a:br>
+              <a:rPr lang="en-US" sz="3500" dirty="0">
+                <a:solidFill>
+                  <a:srgbClr val="FFFFFF"/>
+                </a:solidFill>
+              </a:rPr>
+            </a:br>
+            <a:endParaRPr lang="en-US" sz="3500" kern="1200" dirty="0">
+              <a:solidFill>
+                <a:srgbClr val="FFFFFF"/>
+              </a:solidFill>
+              <a:latin typeface="+mj-lt"/>
+              <a:ea typeface="+mj-ea"/>
+              <a:cs typeface="+mj-cs"/>
+            </a:endParaRPr>
+          </a:p>
+        </p:txBody>
+      </p:sp>
+      <p:cxnSp>
+        <p:nvCxnSpPr>
+          <p:cNvPr id="23" name="Straight Connector 22">
+            <a:extLst>
+              <a:ext uri="{FF2B5EF4-FFF2-40B4-BE49-F238E27FC236}">
+                <a16:creationId xmlns:a16="http://schemas.microsoft.com/office/drawing/2014/main" id="{7E7C77BC-7138-40B1-A15B-20F57A494629}"/>
+              </a:ext>
+              <a:ext uri="{C183D7F6-B498-43B3-948B-1728B52AA6E4}">
+                <adec:decorative xmlns:adec="http://schemas.microsoft.com/office/drawing/2017/decorative" val="1"/>
+              </a:ext>
+            </a:extLst>
+          </p:cNvPr>
+          <p:cNvCxnSpPr>
+            <a:cxnSpLocks noGrp="1" noRot="1" noChangeAspect="1" noMove="1" noResize="1" noEditPoints="1" noAdjustHandles="1" noChangeArrowheads="1" noChangeShapeType="1"/>
+          </p:cNvCxnSpPr>
+          <p:nvPr>
+            <p:extLst>
+              <p:ext uri="{386F3935-93C4-4BCD-93E2-E3B085C9AB24}">
+                <p16:designElem xmlns:p16="http://schemas.microsoft.com/office/powerpoint/2015/main" val="1"/>
+              </p:ext>
+            </p:extLst>
+          </p:nvPr>
+        </p:nvCxnSpPr>
+        <p:spPr>
+          <a:xfrm>
+            <a:off x="2209800" y="1448631"/>
+            <a:ext cx="7772400" cy="0"/>
+          </a:xfrm>
+          <a:prstGeom prst="line">
+            <a:avLst/>
+          </a:prstGeom>
+          <a:ln w="22225">
+            <a:solidFill>
+              <a:srgbClr val="D9D9D9"/>
+            </a:solidFill>
+          </a:ln>
+        </p:spPr>
+        <p:style>
+          <a:lnRef idx="1">
+            <a:schemeClr val="accent1"/>
+          </a:lnRef>
+          <a:fillRef idx="0">
+            <a:schemeClr val="accent1"/>
+          </a:fillRef>
+          <a:effectRef idx="0">
+            <a:schemeClr val="accent1"/>
+          </a:effectRef>
+          <a:fontRef idx="minor">
+            <a:schemeClr val="tx1"/>
+          </a:fontRef>
+        </p:style>
+      </p:cxnSp>
+      <p:pic>
+        <p:nvPicPr>
+          <p:cNvPr id="11" name="Picture 2" descr="Image result for bitcoin image">
+            <a:extLst>
+              <a:ext uri="{FF2B5EF4-FFF2-40B4-BE49-F238E27FC236}">
+                <a16:creationId xmlns:a16="http://schemas.microsoft.com/office/drawing/2014/main" id="{28C2E534-3A8A-4160-808C-C5EA5EE7195A}"/>
+              </a:ext>
+            </a:extLst>
+          </p:cNvPr>
+          <p:cNvPicPr>
+            <a:picLocks noChangeAspect="1" noChangeArrowheads="1"/>
+          </p:cNvPicPr>
+          <p:nvPr/>
+        </p:nvPicPr>
+        <p:blipFill rotWithShape="1">
+          <a:blip r:embed="rId2">
+            <a:extLst>
+              <a:ext uri="{28A0092B-C50C-407E-A947-70E740481C1C}">
+                <a14:useLocalDpi xmlns:a14="http://schemas.microsoft.com/office/drawing/2010/main" val="0"/>
+              </a:ext>
+            </a:extLst>
+          </a:blip>
+          <a:srcRect l="20360" r="5403" b="-3"/>
+          <a:stretch/>
+        </p:blipFill>
+        <p:spPr bwMode="auto">
+          <a:xfrm>
+            <a:off x="10628232" y="5484694"/>
+            <a:ext cx="1433628" cy="1289082"/>
+          </a:xfrm>
+          <a:prstGeom prst="rect">
+            <a:avLst/>
+          </a:prstGeom>
+          <a:extLst>
+            <a:ext uri="{909E8E84-426E-40DD-AFC4-6F175D3DCCD1}">
+              <a14:hiddenFill xmlns:a14="http://schemas.microsoft.com/office/drawing/2010/main">
+                <a:solidFill>
+                  <a:srgbClr val="FFFFFF"/>
+                </a:solidFill>
+              </a14:hiddenFill>
+            </a:ext>
+          </a:extLst>
+        </p:spPr>
+      </p:pic>
+      <p:pic>
+        <p:nvPicPr>
+          <p:cNvPr id="7" name="Content Placeholder 6">
+            <a:extLst>
+              <a:ext uri="{FF2B5EF4-FFF2-40B4-BE49-F238E27FC236}">
+                <a16:creationId xmlns:a16="http://schemas.microsoft.com/office/drawing/2014/main" id="{A49F0101-3429-45EE-8428-673D8B7E1F65}"/>
+              </a:ext>
+            </a:extLst>
+          </p:cNvPr>
+          <p:cNvPicPr>
+            <a:picLocks noGrp="1" noChangeAspect="1"/>
+          </p:cNvPicPr>
+          <p:nvPr>
+            <p:ph idx="1"/>
+          </p:nvPr>
+        </p:nvPicPr>
+        <p:blipFill>
+          <a:blip r:embed="rId3">
+            <a:extLst>
+              <a:ext uri="{28A0092B-C50C-407E-A947-70E740481C1C}">
+                <a14:useLocalDpi xmlns:a14="http://schemas.microsoft.com/office/drawing/2010/main" val="0"/>
+              </a:ext>
+            </a:extLst>
+          </a:blip>
+          <a:srcRect/>
+          <a:stretch/>
+        </p:blipFill>
+        <p:spPr>
+          <a:xfrm>
+            <a:off x="780780" y="2576308"/>
+            <a:ext cx="7996191" cy="3574539"/>
+          </a:xfrm>
+        </p:spPr>
+      </p:pic>
+      <p:sp>
+        <p:nvSpPr>
+          <p:cNvPr id="8" name="Rectangle 7">
+            <a:extLst>
+              <a:ext uri="{FF2B5EF4-FFF2-40B4-BE49-F238E27FC236}">
+                <a16:creationId xmlns:a16="http://schemas.microsoft.com/office/drawing/2014/main" id="{8D12C32D-A090-45AD-A73D-B2E8879B8BB3}"/>
+              </a:ext>
+            </a:extLst>
+          </p:cNvPr>
+          <p:cNvSpPr/>
+          <p:nvPr/>
+        </p:nvSpPr>
+        <p:spPr>
+          <a:xfrm>
+            <a:off x="8656982" y="3244334"/>
+            <a:ext cx="3404877" cy="1200329"/>
+          </a:xfrm>
+          <a:prstGeom prst="rect">
+            <a:avLst/>
+          </a:prstGeom>
+        </p:spPr>
+        <p:txBody>
+          <a:bodyPr wrap="square">
+            <a:spAutoFit/>
+          </a:bodyPr>
+          <a:lstStyle/>
+          <a:p>
+            <a:pPr algn="just"/>
+            <a:r>
+              <a:rPr lang="en-US" dirty="0"/>
+              <a:t>The market capitalization (or network value) is defined as the product of the current supply by the current USD price.</a:t>
+            </a:r>
+            <a:endParaRPr lang="en-US" sz="3000" dirty="0"/>
+          </a:p>
+        </p:txBody>
+      </p:sp>
+    </p:spTree>
+    <p:extLst>
+      <p:ext uri="{BB962C8B-B14F-4D97-AF65-F5344CB8AC3E}">
+        <p14:creationId xmlns:p14="http://schemas.microsoft.com/office/powerpoint/2010/main" val="3736427872"/>
+      </p:ext>
+    </p:extLst>
+  </p:cSld>
+  <p:clrMapOvr>
+    <a:masterClrMapping/>
+  </p:clrMapOvr>
+</p:sld>
+</file>
+
 <file path=ppt/slides/slide2.xml><?xml version="1.0" encoding="utf-8"?>
 <p:sld xmlns:a="http://schemas.openxmlformats.org/drawingml/2006/main" xmlns:r="http://schemas.openxmlformats.org/officeDocument/2006/relationships" xmlns:p="http://schemas.openxmlformats.org/presentationml/2006/main">
   <p:cSld>
@@ -5786,31 +8742,41 @@
           </a:fontRef>
         </p:style>
       </p:cxnSp>
-      <p:sp>
-        <p:nvSpPr>
-          <p:cNvPr id="2" name="Content Placeholder 1">
-            <a:extLst>
-              <a:ext uri="{FF2B5EF4-FFF2-40B4-BE49-F238E27FC236}">
-                <a16:creationId xmlns:a16="http://schemas.microsoft.com/office/drawing/2014/main" id="{5B113F64-7157-44D2-9504-8DF48EFA8289}"/>
-              </a:ext>
-            </a:extLst>
-          </p:cNvPr>
-          <p:cNvSpPr>
-            <a:spLocks noGrp="1"/>
-          </p:cNvSpPr>
+      <p:pic>
+        <p:nvPicPr>
+          <p:cNvPr id="5" name="Content Placeholder 4">
+            <a:extLst>
+              <a:ext uri="{FF2B5EF4-FFF2-40B4-BE49-F238E27FC236}">
+                <a16:creationId xmlns:a16="http://schemas.microsoft.com/office/drawing/2014/main" id="{AA4C2BB5-B819-401E-A295-6E29F188A508}"/>
+              </a:ext>
+            </a:extLst>
+          </p:cNvPr>
+          <p:cNvPicPr>
+            <a:picLocks noGrp="1" noChangeAspect="1"/>
+          </p:cNvPicPr>
           <p:nvPr>
             <p:ph idx="1"/>
           </p:nvPr>
-        </p:nvSpPr>
-        <p:spPr/>
-        <p:txBody>
-          <a:bodyPr/>
-          <a:lstStyle/>
-          <a:p>
-            <a:endParaRPr lang="en-US" dirty="0"/>
-          </a:p>
-        </p:txBody>
-      </p:sp>
+        </p:nvPicPr>
+        <p:blipFill>
+          <a:blip r:embed="rId2">
+            <a:extLst>
+              <a:ext uri="{28A0092B-C50C-407E-A947-70E740481C1C}">
+                <a14:useLocalDpi xmlns:a14="http://schemas.microsoft.com/office/drawing/2010/main" val="0"/>
+              </a:ext>
+            </a:extLst>
+          </a:blip>
+          <a:stretch>
+            <a:fillRect/>
+          </a:stretch>
+        </p:blipFill>
+        <p:spPr>
+          <a:xfrm>
+            <a:off x="333782" y="2310835"/>
+            <a:ext cx="7135475" cy="3746500"/>
+          </a:xfrm>
+        </p:spPr>
+      </p:pic>
       <p:pic>
         <p:nvPicPr>
           <p:cNvPr id="11" name="Picture 2" descr="Image result for bitcoin image">
@@ -5826,7 +8792,7 @@
           <p:nvPr/>
         </p:nvPicPr>
         <p:blipFill rotWithShape="1">
-          <a:blip r:embed="rId2">
+          <a:blip r:embed="rId3">
             <a:extLst>
               <a:ext uri="{28A0092B-C50C-407E-A947-70E740481C1C}">
                 <a14:useLocalDpi xmlns:a14="http://schemas.microsoft.com/office/drawing/2010/main" val="0"/>
@@ -5855,10 +8821,745 @@
           </a:extLst>
         </p:spPr>
       </p:pic>
+      <p:sp>
+        <p:nvSpPr>
+          <p:cNvPr id="10" name="Rectangle 9">
+            <a:extLst>
+              <a:ext uri="{FF2B5EF4-FFF2-40B4-BE49-F238E27FC236}">
+                <a16:creationId xmlns:a16="http://schemas.microsoft.com/office/drawing/2014/main" id="{FA6A3351-1DB3-4235-B2A2-5EC3CC29A089}"/>
+              </a:ext>
+            </a:extLst>
+          </p:cNvPr>
+          <p:cNvSpPr/>
+          <p:nvPr/>
+        </p:nvSpPr>
+        <p:spPr>
+          <a:xfrm>
+            <a:off x="6629399" y="3169794"/>
+            <a:ext cx="5362161" cy="1477328"/>
+          </a:xfrm>
+          <a:prstGeom prst="rect">
+            <a:avLst/>
+          </a:prstGeom>
+        </p:spPr>
+        <p:txBody>
+          <a:bodyPr wrap="square">
+            <a:spAutoFit/>
+          </a:bodyPr>
+          <a:lstStyle/>
+          <a:p>
+            <a:pPr algn="just"/>
+            <a:r>
+              <a:rPr lang="en-US" dirty="0"/>
+              <a:t>Bitcoin supply is capped at 21 million, once it is reached no more bitcoin will be mined. As of January 2017 80 % of the supply is already available. Once the cap is reached then it's value will be determined on how popular and attractive other cryptocurrencies will be.</a:t>
+            </a:r>
+            <a:endParaRPr lang="en-US" sz="3000" dirty="0"/>
+          </a:p>
+        </p:txBody>
+      </p:sp>
     </p:spTree>
     <p:extLst>
       <p:ext uri="{BB962C8B-B14F-4D97-AF65-F5344CB8AC3E}">
         <p14:creationId xmlns:p14="http://schemas.microsoft.com/office/powerpoint/2010/main" val="1929715282"/>
+      </p:ext>
+    </p:extLst>
+  </p:cSld>
+  <p:clrMapOvr>
+    <a:masterClrMapping/>
+  </p:clrMapOvr>
+</p:sld>
+</file>
+
+<file path=ppt/slides/slide8.xml><?xml version="1.0" encoding="utf-8"?>
+<p:sld xmlns:a="http://schemas.openxmlformats.org/drawingml/2006/main" xmlns:r="http://schemas.openxmlformats.org/officeDocument/2006/relationships" xmlns:p="http://schemas.openxmlformats.org/presentationml/2006/main">
+  <p:cSld>
+    <p:bg>
+      <p:bgPr>
+        <a:solidFill>
+          <a:schemeClr val="bg1"/>
+        </a:solidFill>
+        <a:effectLst/>
+      </p:bgPr>
+    </p:bg>
+    <p:spTree>
+      <p:nvGrpSpPr>
+        <p:cNvPr id="1" name=""/>
+        <p:cNvGrpSpPr/>
+        <p:nvPr/>
+      </p:nvGrpSpPr>
+      <p:grpSpPr>
+        <a:xfrm>
+          <a:off x="0" y="0"/>
+          <a:ext cx="0" cy="0"/>
+          <a:chOff x="0" y="0"/>
+          <a:chExt cx="0" cy="0"/>
+        </a:xfrm>
+      </p:grpSpPr>
+      <p:sp>
+        <p:nvSpPr>
+          <p:cNvPr id="21" name="Rectangle 20">
+            <a:extLst>
+              <a:ext uri="{FF2B5EF4-FFF2-40B4-BE49-F238E27FC236}">
+                <a16:creationId xmlns:a16="http://schemas.microsoft.com/office/drawing/2014/main" id="{823AC064-BC96-4F32-8AE1-B2FD38754823}"/>
+              </a:ext>
+              <a:ext uri="{C183D7F6-B498-43B3-948B-1728B52AA6E4}">
+                <adec:decorative xmlns:adec="http://schemas.microsoft.com/office/drawing/2017/decorative" val="1"/>
+              </a:ext>
+            </a:extLst>
+          </p:cNvPr>
+          <p:cNvSpPr>
+            <a:spLocks noGrp="1" noRot="1" noChangeAspect="1" noMove="1" noResize="1" noEditPoints="1" noAdjustHandles="1" noChangeArrowheads="1" noChangeShapeType="1" noTextEdit="1"/>
+          </p:cNvSpPr>
+          <p:nvPr>
+            <p:extLst>
+              <p:ext uri="{386F3935-93C4-4BCD-93E2-E3B085C9AB24}">
+                <p16:designElem xmlns:p16="http://schemas.microsoft.com/office/powerpoint/2015/main" val="1"/>
+              </p:ext>
+            </p:extLst>
+          </p:nvPr>
+        </p:nvSpPr>
+        <p:spPr bwMode="ltGray">
+          <a:xfrm>
+            <a:off x="378068" y="343486"/>
+            <a:ext cx="11438793" cy="1844256"/>
+          </a:xfrm>
+          <a:prstGeom prst="rect">
+            <a:avLst/>
+          </a:prstGeom>
+          <a:solidFill>
+            <a:srgbClr val="404040"/>
+          </a:solidFill>
+          <a:ln w="127000" cap="sq" cmpd="thinThick">
+            <a:solidFill>
+              <a:srgbClr val="404040"/>
+            </a:solidFill>
+          </a:ln>
+        </p:spPr>
+        <p:style>
+          <a:lnRef idx="2">
+            <a:schemeClr val="accent1">
+              <a:shade val="50000"/>
+            </a:schemeClr>
+          </a:lnRef>
+          <a:fillRef idx="1">
+            <a:schemeClr val="accent1"/>
+          </a:fillRef>
+          <a:effectRef idx="0">
+            <a:schemeClr val="accent1"/>
+          </a:effectRef>
+          <a:fontRef idx="minor">
+            <a:schemeClr val="lt1"/>
+          </a:fontRef>
+        </p:style>
+        <p:txBody>
+          <a:bodyPr rtlCol="0" anchor="ctr"/>
+          <a:lstStyle/>
+          <a:p>
+            <a:pPr marL="0" marR="0" lvl="0" indent="0" algn="ctr" defTabSz="914400" rtl="0" eaLnBrk="1" fontAlgn="auto" latinLnBrk="0" hangingPunct="1">
+              <a:lnSpc>
+                <a:spcPct val="100000"/>
+              </a:lnSpc>
+              <a:spcBef>
+                <a:spcPts val="0"/>
+              </a:spcBef>
+              <a:spcAft>
+                <a:spcPts val="0"/>
+              </a:spcAft>
+              <a:buClrTx/>
+              <a:buSzTx/>
+              <a:buFontTx/>
+              <a:buNone/>
+              <a:tabLst/>
+              <a:defRPr/>
+            </a:pPr>
+            <a:endParaRPr kumimoji="0" lang="en-US" sz="1800" b="0" i="0" u="none" strike="noStrike" kern="1200" cap="none" spc="0" normalizeH="0" baseline="0" noProof="0">
+              <a:ln>
+                <a:noFill/>
+              </a:ln>
+              <a:solidFill>
+                <a:prstClr val="white"/>
+              </a:solidFill>
+              <a:effectLst/>
+              <a:uLnTx/>
+              <a:uFillTx/>
+              <a:latin typeface="Calibri" panose="020F0502020204030204"/>
+              <a:ea typeface="+mn-ea"/>
+              <a:cs typeface="+mn-cs"/>
+            </a:endParaRPr>
+          </a:p>
+        </p:txBody>
+      </p:sp>
+      <p:sp>
+        <p:nvSpPr>
+          <p:cNvPr id="3" name="Title 2">
+            <a:extLst>
+              <a:ext uri="{FF2B5EF4-FFF2-40B4-BE49-F238E27FC236}">
+                <a16:creationId xmlns:a16="http://schemas.microsoft.com/office/drawing/2014/main" id="{7472A1B1-DDE7-4029-BF17-FEBDBD755E58}"/>
+              </a:ext>
+            </a:extLst>
+          </p:cNvPr>
+          <p:cNvSpPr>
+            <a:spLocks noGrp="1"/>
+          </p:cNvSpPr>
+          <p:nvPr>
+            <p:ph type="title"/>
+          </p:nvPr>
+        </p:nvSpPr>
+        <p:spPr>
+          <a:xfrm>
+            <a:off x="375139" y="466579"/>
+            <a:ext cx="11290788" cy="1447276"/>
+          </a:xfrm>
+        </p:spPr>
+        <p:txBody>
+          <a:bodyPr vert="horz" lIns="91440" tIns="45720" rIns="91440" bIns="45720" rtlCol="0" anchor="b">
+            <a:normAutofit fontScale="90000"/>
+          </a:bodyPr>
+          <a:lstStyle/>
+          <a:p>
+            <a:pPr algn="ctr"/>
+            <a:br>
+              <a:rPr lang="en-US" sz="3500" dirty="0">
+                <a:solidFill>
+                  <a:srgbClr val="FFFFFF"/>
+                </a:solidFill>
+              </a:rPr>
+            </a:br>
+            <a:r>
+              <a:rPr lang="en-US" sz="3500" dirty="0">
+                <a:solidFill>
+                  <a:srgbClr val="FFFFFF"/>
+                </a:solidFill>
+              </a:rPr>
+              <a:t>Factors that may affect investor sentiment on Bitcoin</a:t>
+            </a:r>
+            <a:br>
+              <a:rPr lang="en-US" sz="3500" dirty="0">
+                <a:solidFill>
+                  <a:srgbClr val="FFFFFF"/>
+                </a:solidFill>
+              </a:rPr>
+            </a:br>
+            <a:br>
+              <a:rPr lang="en-US" sz="3500" dirty="0">
+                <a:solidFill>
+                  <a:srgbClr val="FFFFFF"/>
+                </a:solidFill>
+              </a:rPr>
+            </a:br>
+            <a:endParaRPr lang="en-US" sz="3500" kern="1200" dirty="0">
+              <a:solidFill>
+                <a:srgbClr val="FFFFFF"/>
+              </a:solidFill>
+              <a:latin typeface="+mj-lt"/>
+              <a:ea typeface="+mj-ea"/>
+              <a:cs typeface="+mj-cs"/>
+            </a:endParaRPr>
+          </a:p>
+        </p:txBody>
+      </p:sp>
+      <p:cxnSp>
+        <p:nvCxnSpPr>
+          <p:cNvPr id="23" name="Straight Connector 22">
+            <a:extLst>
+              <a:ext uri="{FF2B5EF4-FFF2-40B4-BE49-F238E27FC236}">
+                <a16:creationId xmlns:a16="http://schemas.microsoft.com/office/drawing/2014/main" id="{7E7C77BC-7138-40B1-A15B-20F57A494629}"/>
+              </a:ext>
+              <a:ext uri="{C183D7F6-B498-43B3-948B-1728B52AA6E4}">
+                <adec:decorative xmlns:adec="http://schemas.microsoft.com/office/drawing/2017/decorative" val="1"/>
+              </a:ext>
+            </a:extLst>
+          </p:cNvPr>
+          <p:cNvCxnSpPr>
+            <a:cxnSpLocks noGrp="1" noRot="1" noChangeAspect="1" noMove="1" noResize="1" noEditPoints="1" noAdjustHandles="1" noChangeArrowheads="1" noChangeShapeType="1"/>
+          </p:cNvCxnSpPr>
+          <p:nvPr>
+            <p:extLst>
+              <p:ext uri="{386F3935-93C4-4BCD-93E2-E3B085C9AB24}">
+                <p16:designElem xmlns:p16="http://schemas.microsoft.com/office/powerpoint/2015/main" val="1"/>
+              </p:ext>
+            </p:extLst>
+          </p:nvPr>
+        </p:nvCxnSpPr>
+        <p:spPr>
+          <a:xfrm>
+            <a:off x="2209800" y="1448631"/>
+            <a:ext cx="7772400" cy="0"/>
+          </a:xfrm>
+          <a:prstGeom prst="line">
+            <a:avLst/>
+          </a:prstGeom>
+          <a:ln w="22225">
+            <a:solidFill>
+              <a:srgbClr val="D9D9D9"/>
+            </a:solidFill>
+          </a:ln>
+        </p:spPr>
+        <p:style>
+          <a:lnRef idx="1">
+            <a:schemeClr val="accent1"/>
+          </a:lnRef>
+          <a:fillRef idx="0">
+            <a:schemeClr val="accent1"/>
+          </a:fillRef>
+          <a:effectRef idx="0">
+            <a:schemeClr val="accent1"/>
+          </a:effectRef>
+          <a:fontRef idx="minor">
+            <a:schemeClr val="tx1"/>
+          </a:fontRef>
+        </p:style>
+      </p:cxnSp>
+      <p:pic>
+        <p:nvPicPr>
+          <p:cNvPr id="11" name="Picture 2" descr="Image result for bitcoin image">
+            <a:extLst>
+              <a:ext uri="{FF2B5EF4-FFF2-40B4-BE49-F238E27FC236}">
+                <a16:creationId xmlns:a16="http://schemas.microsoft.com/office/drawing/2014/main" id="{28C2E534-3A8A-4160-808C-C5EA5EE7195A}"/>
+              </a:ext>
+            </a:extLst>
+          </p:cNvPr>
+          <p:cNvPicPr>
+            <a:picLocks noChangeAspect="1" noChangeArrowheads="1"/>
+          </p:cNvPicPr>
+          <p:nvPr/>
+        </p:nvPicPr>
+        <p:blipFill rotWithShape="1">
+          <a:blip r:embed="rId2">
+            <a:extLst>
+              <a:ext uri="{28A0092B-C50C-407E-A947-70E740481C1C}">
+                <a14:useLocalDpi xmlns:a14="http://schemas.microsoft.com/office/drawing/2010/main" val="0"/>
+              </a:ext>
+            </a:extLst>
+          </a:blip>
+          <a:srcRect l="20360" r="5403" b="-3"/>
+          <a:stretch/>
+        </p:blipFill>
+        <p:spPr bwMode="auto">
+          <a:xfrm>
+            <a:off x="10628232" y="5484694"/>
+            <a:ext cx="1433628" cy="1289082"/>
+          </a:xfrm>
+          <a:prstGeom prst="rect">
+            <a:avLst/>
+          </a:prstGeom>
+          <a:extLst>
+            <a:ext uri="{909E8E84-426E-40DD-AFC4-6F175D3DCCD1}">
+              <a14:hiddenFill xmlns:a14="http://schemas.microsoft.com/office/drawing/2010/main">
+                <a:solidFill>
+                  <a:srgbClr val="FFFFFF"/>
+                </a:solidFill>
+              </a14:hiddenFill>
+            </a:ext>
+          </a:extLst>
+        </p:spPr>
+      </p:pic>
+      <p:pic>
+        <p:nvPicPr>
+          <p:cNvPr id="7" name="Content Placeholder 6">
+            <a:extLst>
+              <a:ext uri="{FF2B5EF4-FFF2-40B4-BE49-F238E27FC236}">
+                <a16:creationId xmlns:a16="http://schemas.microsoft.com/office/drawing/2014/main" id="{A49F0101-3429-45EE-8428-673D8B7E1F65}"/>
+              </a:ext>
+            </a:extLst>
+          </p:cNvPr>
+          <p:cNvPicPr>
+            <a:picLocks noGrp="1" noChangeAspect="1"/>
+          </p:cNvPicPr>
+          <p:nvPr>
+            <p:ph idx="1"/>
+          </p:nvPr>
+        </p:nvPicPr>
+        <p:blipFill>
+          <a:blip r:embed="rId3">
+            <a:extLst>
+              <a:ext uri="{28A0092B-C50C-407E-A947-70E740481C1C}">
+                <a14:useLocalDpi xmlns:a14="http://schemas.microsoft.com/office/drawing/2010/main" val="0"/>
+              </a:ext>
+            </a:extLst>
+          </a:blip>
+          <a:stretch>
+            <a:fillRect/>
+          </a:stretch>
+        </p:blipFill>
+        <p:spPr>
+          <a:xfrm>
+            <a:off x="487669" y="2310835"/>
+            <a:ext cx="9566767" cy="4105486"/>
+          </a:xfrm>
+        </p:spPr>
+      </p:pic>
+    </p:spTree>
+    <p:extLst>
+      <p:ext uri="{BB962C8B-B14F-4D97-AF65-F5344CB8AC3E}">
+        <p14:creationId xmlns:p14="http://schemas.microsoft.com/office/powerpoint/2010/main" val="1489829755"/>
+      </p:ext>
+    </p:extLst>
+  </p:cSld>
+  <p:clrMapOvr>
+    <a:masterClrMapping/>
+  </p:clrMapOvr>
+</p:sld>
+</file>
+
+<file path=ppt/slides/slide9.xml><?xml version="1.0" encoding="utf-8"?>
+<p:sld xmlns:a="http://schemas.openxmlformats.org/drawingml/2006/main" xmlns:r="http://schemas.openxmlformats.org/officeDocument/2006/relationships" xmlns:p="http://schemas.openxmlformats.org/presentationml/2006/main">
+  <p:cSld>
+    <p:bg>
+      <p:bgPr>
+        <a:solidFill>
+          <a:schemeClr val="bg1"/>
+        </a:solidFill>
+        <a:effectLst/>
+      </p:bgPr>
+    </p:bg>
+    <p:spTree>
+      <p:nvGrpSpPr>
+        <p:cNvPr id="1" name=""/>
+        <p:cNvGrpSpPr/>
+        <p:nvPr/>
+      </p:nvGrpSpPr>
+      <p:grpSpPr>
+        <a:xfrm>
+          <a:off x="0" y="0"/>
+          <a:ext cx="0" cy="0"/>
+          <a:chOff x="0" y="0"/>
+          <a:chExt cx="0" cy="0"/>
+        </a:xfrm>
+      </p:grpSpPr>
+      <p:sp>
+        <p:nvSpPr>
+          <p:cNvPr id="21" name="Rectangle 20">
+            <a:extLst>
+              <a:ext uri="{FF2B5EF4-FFF2-40B4-BE49-F238E27FC236}">
+                <a16:creationId xmlns:a16="http://schemas.microsoft.com/office/drawing/2014/main" id="{823AC064-BC96-4F32-8AE1-B2FD38754823}"/>
+              </a:ext>
+              <a:ext uri="{C183D7F6-B498-43B3-948B-1728B52AA6E4}">
+                <adec:decorative xmlns:adec="http://schemas.microsoft.com/office/drawing/2017/decorative" val="1"/>
+              </a:ext>
+            </a:extLst>
+          </p:cNvPr>
+          <p:cNvSpPr>
+            <a:spLocks noGrp="1" noRot="1" noChangeAspect="1" noMove="1" noResize="1" noEditPoints="1" noAdjustHandles="1" noChangeArrowheads="1" noChangeShapeType="1" noTextEdit="1"/>
+          </p:cNvSpPr>
+          <p:nvPr>
+            <p:extLst>
+              <p:ext uri="{386F3935-93C4-4BCD-93E2-E3B085C9AB24}">
+                <p16:designElem xmlns:p16="http://schemas.microsoft.com/office/powerpoint/2015/main" val="1"/>
+              </p:ext>
+            </p:extLst>
+          </p:nvPr>
+        </p:nvSpPr>
+        <p:spPr bwMode="ltGray">
+          <a:xfrm>
+            <a:off x="378068" y="343486"/>
+            <a:ext cx="11438793" cy="1844256"/>
+          </a:xfrm>
+          <a:prstGeom prst="rect">
+            <a:avLst/>
+          </a:prstGeom>
+          <a:solidFill>
+            <a:srgbClr val="404040"/>
+          </a:solidFill>
+          <a:ln w="127000" cap="sq" cmpd="thinThick">
+            <a:solidFill>
+              <a:srgbClr val="404040"/>
+            </a:solidFill>
+          </a:ln>
+        </p:spPr>
+        <p:style>
+          <a:lnRef idx="2">
+            <a:schemeClr val="accent1">
+              <a:shade val="50000"/>
+            </a:schemeClr>
+          </a:lnRef>
+          <a:fillRef idx="1">
+            <a:schemeClr val="accent1"/>
+          </a:fillRef>
+          <a:effectRef idx="0">
+            <a:schemeClr val="accent1"/>
+          </a:effectRef>
+          <a:fontRef idx="minor">
+            <a:schemeClr val="lt1"/>
+          </a:fontRef>
+        </p:style>
+        <p:txBody>
+          <a:bodyPr rtlCol="0" anchor="ctr"/>
+          <a:lstStyle/>
+          <a:p>
+            <a:pPr marL="0" marR="0" lvl="0" indent="0" algn="ctr" defTabSz="914400" rtl="0" eaLnBrk="1" fontAlgn="auto" latinLnBrk="0" hangingPunct="1">
+              <a:lnSpc>
+                <a:spcPct val="100000"/>
+              </a:lnSpc>
+              <a:spcBef>
+                <a:spcPts val="0"/>
+              </a:spcBef>
+              <a:spcAft>
+                <a:spcPts val="0"/>
+              </a:spcAft>
+              <a:buClrTx/>
+              <a:buSzTx/>
+              <a:buFontTx/>
+              <a:buNone/>
+              <a:tabLst/>
+              <a:defRPr/>
+            </a:pPr>
+            <a:endParaRPr kumimoji="0" lang="en-US" sz="1800" b="0" i="0" u="none" strike="noStrike" kern="1200" cap="none" spc="0" normalizeH="0" baseline="0" noProof="0">
+              <a:ln>
+                <a:noFill/>
+              </a:ln>
+              <a:solidFill>
+                <a:prstClr val="white"/>
+              </a:solidFill>
+              <a:effectLst/>
+              <a:uLnTx/>
+              <a:uFillTx/>
+              <a:latin typeface="Calibri" panose="020F0502020204030204"/>
+              <a:ea typeface="+mn-ea"/>
+              <a:cs typeface="+mn-cs"/>
+            </a:endParaRPr>
+          </a:p>
+        </p:txBody>
+      </p:sp>
+      <p:sp>
+        <p:nvSpPr>
+          <p:cNvPr id="3" name="Title 2">
+            <a:extLst>
+              <a:ext uri="{FF2B5EF4-FFF2-40B4-BE49-F238E27FC236}">
+                <a16:creationId xmlns:a16="http://schemas.microsoft.com/office/drawing/2014/main" id="{7472A1B1-DDE7-4029-BF17-FEBDBD755E58}"/>
+              </a:ext>
+            </a:extLst>
+          </p:cNvPr>
+          <p:cNvSpPr>
+            <a:spLocks noGrp="1"/>
+          </p:cNvSpPr>
+          <p:nvPr>
+            <p:ph type="title"/>
+          </p:nvPr>
+        </p:nvSpPr>
+        <p:spPr>
+          <a:xfrm>
+            <a:off x="375139" y="466579"/>
+            <a:ext cx="11290788" cy="1447276"/>
+          </a:xfrm>
+        </p:spPr>
+        <p:txBody>
+          <a:bodyPr vert="horz" lIns="91440" tIns="45720" rIns="91440" bIns="45720" rtlCol="0" anchor="b">
+            <a:normAutofit fontScale="90000"/>
+          </a:bodyPr>
+          <a:lstStyle/>
+          <a:p>
+            <a:pPr algn="ctr"/>
+            <a:br>
+              <a:rPr lang="en-US" sz="3500" dirty="0">
+                <a:solidFill>
+                  <a:srgbClr val="FFFFFF"/>
+                </a:solidFill>
+              </a:rPr>
+            </a:br>
+            <a:r>
+              <a:rPr lang="en-US" sz="3500" dirty="0">
+                <a:solidFill>
+                  <a:srgbClr val="FFFFFF"/>
+                </a:solidFill>
+              </a:rPr>
+              <a:t>Factors that may affect investor sentiment on Bitcoin</a:t>
+            </a:r>
+            <a:br>
+              <a:rPr lang="en-US" sz="3500" dirty="0">
+                <a:solidFill>
+                  <a:srgbClr val="FFFFFF"/>
+                </a:solidFill>
+              </a:rPr>
+            </a:br>
+            <a:br>
+              <a:rPr lang="en-US" sz="3500" dirty="0">
+                <a:solidFill>
+                  <a:srgbClr val="FFFFFF"/>
+                </a:solidFill>
+              </a:rPr>
+            </a:br>
+            <a:endParaRPr lang="en-US" sz="3500" kern="1200" dirty="0">
+              <a:solidFill>
+                <a:srgbClr val="FFFFFF"/>
+              </a:solidFill>
+              <a:latin typeface="+mj-lt"/>
+              <a:ea typeface="+mj-ea"/>
+              <a:cs typeface="+mj-cs"/>
+            </a:endParaRPr>
+          </a:p>
+        </p:txBody>
+      </p:sp>
+      <p:cxnSp>
+        <p:nvCxnSpPr>
+          <p:cNvPr id="23" name="Straight Connector 22">
+            <a:extLst>
+              <a:ext uri="{FF2B5EF4-FFF2-40B4-BE49-F238E27FC236}">
+                <a16:creationId xmlns:a16="http://schemas.microsoft.com/office/drawing/2014/main" id="{7E7C77BC-7138-40B1-A15B-20F57A494629}"/>
+              </a:ext>
+              <a:ext uri="{C183D7F6-B498-43B3-948B-1728B52AA6E4}">
+                <adec:decorative xmlns:adec="http://schemas.microsoft.com/office/drawing/2017/decorative" val="1"/>
+              </a:ext>
+            </a:extLst>
+          </p:cNvPr>
+          <p:cNvCxnSpPr>
+            <a:cxnSpLocks noGrp="1" noRot="1" noChangeAspect="1" noMove="1" noResize="1" noEditPoints="1" noAdjustHandles="1" noChangeArrowheads="1" noChangeShapeType="1"/>
+          </p:cNvCxnSpPr>
+          <p:nvPr>
+            <p:extLst>
+              <p:ext uri="{386F3935-93C4-4BCD-93E2-E3B085C9AB24}">
+                <p16:designElem xmlns:p16="http://schemas.microsoft.com/office/powerpoint/2015/main" val="1"/>
+              </p:ext>
+            </p:extLst>
+          </p:nvPr>
+        </p:nvCxnSpPr>
+        <p:spPr>
+          <a:xfrm>
+            <a:off x="2209800" y="1448631"/>
+            <a:ext cx="7772400" cy="0"/>
+          </a:xfrm>
+          <a:prstGeom prst="line">
+            <a:avLst/>
+          </a:prstGeom>
+          <a:ln w="22225">
+            <a:solidFill>
+              <a:srgbClr val="D9D9D9"/>
+            </a:solidFill>
+          </a:ln>
+        </p:spPr>
+        <p:style>
+          <a:lnRef idx="1">
+            <a:schemeClr val="accent1"/>
+          </a:lnRef>
+          <a:fillRef idx="0">
+            <a:schemeClr val="accent1"/>
+          </a:fillRef>
+          <a:effectRef idx="0">
+            <a:schemeClr val="accent1"/>
+          </a:effectRef>
+          <a:fontRef idx="minor">
+            <a:schemeClr val="tx1"/>
+          </a:fontRef>
+        </p:style>
+      </p:cxnSp>
+      <p:pic>
+        <p:nvPicPr>
+          <p:cNvPr id="11" name="Picture 2" descr="Image result for bitcoin image">
+            <a:extLst>
+              <a:ext uri="{FF2B5EF4-FFF2-40B4-BE49-F238E27FC236}">
+                <a16:creationId xmlns:a16="http://schemas.microsoft.com/office/drawing/2014/main" id="{28C2E534-3A8A-4160-808C-C5EA5EE7195A}"/>
+              </a:ext>
+            </a:extLst>
+          </p:cNvPr>
+          <p:cNvPicPr>
+            <a:picLocks noChangeAspect="1" noChangeArrowheads="1"/>
+          </p:cNvPicPr>
+          <p:nvPr/>
+        </p:nvPicPr>
+        <p:blipFill rotWithShape="1">
+          <a:blip r:embed="rId2">
+            <a:extLst>
+              <a:ext uri="{28A0092B-C50C-407E-A947-70E740481C1C}">
+                <a14:useLocalDpi xmlns:a14="http://schemas.microsoft.com/office/drawing/2010/main" val="0"/>
+              </a:ext>
+            </a:extLst>
+          </a:blip>
+          <a:srcRect l="20360" r="5403" b="-3"/>
+          <a:stretch/>
+        </p:blipFill>
+        <p:spPr bwMode="auto">
+          <a:xfrm>
+            <a:off x="10628232" y="5484694"/>
+            <a:ext cx="1433628" cy="1289082"/>
+          </a:xfrm>
+          <a:prstGeom prst="rect">
+            <a:avLst/>
+          </a:prstGeom>
+          <a:extLst>
+            <a:ext uri="{909E8E84-426E-40DD-AFC4-6F175D3DCCD1}">
+              <a14:hiddenFill xmlns:a14="http://schemas.microsoft.com/office/drawing/2010/main">
+                <a:solidFill>
+                  <a:srgbClr val="FFFFFF"/>
+                </a:solidFill>
+              </a14:hiddenFill>
+            </a:ext>
+          </a:extLst>
+        </p:spPr>
+      </p:pic>
+      <p:pic>
+        <p:nvPicPr>
+          <p:cNvPr id="7" name="Content Placeholder 6">
+            <a:extLst>
+              <a:ext uri="{FF2B5EF4-FFF2-40B4-BE49-F238E27FC236}">
+                <a16:creationId xmlns:a16="http://schemas.microsoft.com/office/drawing/2014/main" id="{A49F0101-3429-45EE-8428-673D8B7E1F65}"/>
+              </a:ext>
+            </a:extLst>
+          </p:cNvPr>
+          <p:cNvPicPr>
+            <a:picLocks noGrp="1" noChangeAspect="1"/>
+          </p:cNvPicPr>
+          <p:nvPr>
+            <p:ph idx="1"/>
+          </p:nvPr>
+        </p:nvPicPr>
+        <p:blipFill>
+          <a:blip r:embed="rId3">
+            <a:extLst>
+              <a:ext uri="{28A0092B-C50C-407E-A947-70E740481C1C}">
+                <a14:useLocalDpi xmlns:a14="http://schemas.microsoft.com/office/drawing/2010/main" val="0"/>
+              </a:ext>
+            </a:extLst>
+          </a:blip>
+          <a:srcRect/>
+          <a:stretch/>
+        </p:blipFill>
+        <p:spPr>
+          <a:xfrm>
+            <a:off x="487669" y="2314009"/>
+            <a:ext cx="8358157" cy="4099137"/>
+          </a:xfrm>
+        </p:spPr>
+      </p:pic>
+      <p:sp>
+        <p:nvSpPr>
+          <p:cNvPr id="8" name="Rectangle 7">
+            <a:extLst>
+              <a:ext uri="{FF2B5EF4-FFF2-40B4-BE49-F238E27FC236}">
+                <a16:creationId xmlns:a16="http://schemas.microsoft.com/office/drawing/2014/main" id="{BD4CDDDF-384A-474B-8D04-E395134AEE1C}"/>
+              </a:ext>
+            </a:extLst>
+          </p:cNvPr>
+          <p:cNvSpPr/>
+          <p:nvPr/>
+        </p:nvSpPr>
+        <p:spPr>
+          <a:xfrm>
+            <a:off x="7976152" y="3215308"/>
+            <a:ext cx="4015408" cy="646331"/>
+          </a:xfrm>
+          <a:prstGeom prst="rect">
+            <a:avLst/>
+          </a:prstGeom>
+        </p:spPr>
+        <p:txBody>
+          <a:bodyPr wrap="square">
+            <a:spAutoFit/>
+          </a:bodyPr>
+          <a:lstStyle/>
+          <a:p>
+            <a:pPr algn="just"/>
+            <a:r>
+              <a:rPr lang="en-US" dirty="0"/>
+              <a:t>The total amount of coins transferred on-chain.</a:t>
+            </a:r>
+            <a:endParaRPr lang="en-US" sz="3000" dirty="0"/>
+          </a:p>
+        </p:txBody>
+      </p:sp>
+    </p:spTree>
+    <p:extLst>
+      <p:ext uri="{BB962C8B-B14F-4D97-AF65-F5344CB8AC3E}">
+        <p14:creationId xmlns:p14="http://schemas.microsoft.com/office/powerpoint/2010/main" val="234122587"/>
       </p:ext>
     </p:extLst>
   </p:cSld>

</xml_diff>

<commit_message>
updating slide 3 with text
</commit_message>
<xml_diff>
--- a/Bitcoin_presentation.pptx
+++ b/Bitcoin_presentation.pptx
@@ -132,7 +132,7 @@
   <pc:docChgLst>
     <pc:chgData name="Manpreet Padam" userId="c774c9fa3d9a7448" providerId="LiveId" clId="{797BF2CA-42B3-4463-95F1-EF67FBB049FC}"/>
     <pc:docChg chg="undo custSel addSld delSld modSld">
-      <pc:chgData name="Manpreet Padam" userId="c774c9fa3d9a7448" providerId="LiveId" clId="{797BF2CA-42B3-4463-95F1-EF67FBB049FC}" dt="2019-10-22T20:03:46.956" v="418" actId="20577"/>
+      <pc:chgData name="Manpreet Padam" userId="c774c9fa3d9a7448" providerId="LiveId" clId="{797BF2CA-42B3-4463-95F1-EF67FBB049FC}" dt="2019-10-22T20:05:51.519" v="419" actId="6549"/>
       <pc:docMkLst>
         <pc:docMk/>
       </pc:docMkLst>
@@ -174,6 +174,21 @@
             <ac:picMk id="5" creationId="{AA4C2BB5-B819-401E-A295-6E29F188A508}"/>
           </ac:picMkLst>
         </pc:picChg>
+      </pc:sldChg>
+      <pc:sldChg chg="modSp">
+        <pc:chgData name="Manpreet Padam" userId="c774c9fa3d9a7448" providerId="LiveId" clId="{797BF2CA-42B3-4463-95F1-EF67FBB049FC}" dt="2019-10-22T20:05:51.519" v="419" actId="6549"/>
+        <pc:sldMkLst>
+          <pc:docMk/>
+          <pc:sldMk cId="4095235714" sldId="265"/>
+        </pc:sldMkLst>
+        <pc:spChg chg="mod">
+          <ac:chgData name="Manpreet Padam" userId="c774c9fa3d9a7448" providerId="LiveId" clId="{797BF2CA-42B3-4463-95F1-EF67FBB049FC}" dt="2019-10-22T20:05:51.519" v="419" actId="6549"/>
+          <ac:spMkLst>
+            <pc:docMk/>
+            <pc:sldMk cId="4095235714" sldId="265"/>
+            <ac:spMk id="18" creationId="{82EB0AB1-723B-4BF0-A0F0-B2FEFC4124EA}"/>
+          </ac:spMkLst>
+        </pc:spChg>
       </pc:sldChg>
       <pc:sldChg chg="addSp delSp modSp add">
         <pc:chgData name="Manpreet Padam" userId="c774c9fa3d9a7448" providerId="LiveId" clId="{797BF2CA-42B3-4463-95F1-EF67FBB049FC}" dt="2019-10-22T19:12:54.660" v="72" actId="1076"/>
@@ -7359,7 +7374,15 @@
           <a:p>
             <a:r>
               <a:rPr lang="en-US" sz="3000" dirty="0"/>
-              <a:t>Based on the plot visuals, we can assume Bitcoin follows a normal distribution and therefore, can be analyzed with traditional statistical analysis</a:t>
+              <a:t>Based on the </a:t>
+            </a:r>
+            <a:r>
+              <a:rPr lang="en-US" sz="3000"/>
+              <a:t>plot visual, </a:t>
+            </a:r>
+            <a:r>
+              <a:rPr lang="en-US" sz="3000" dirty="0"/>
+              <a:t>we can assume Bitcoin follows a normal distribution and therefore, can be analyzed with traditional statistical analysis</a:t>
             </a:r>
           </a:p>
         </p:txBody>

</xml_diff>